<commit_message>
Added first version of alliance sheets
</commit_message>
<xml_diff>
--- a/alliances/alliance_interface.pptx
+++ b/alliances/alliance_interface.pptx
@@ -118,6 +118,10 @@
 </p:presentation>
 </file>
 
+<file path=ppt/revisionInfo.xml><?xml version="1.0" encoding="utf-8"?>
+<p1510:revInfo xmlns:a="http://schemas.openxmlformats.org/drawingml/2006/main" xmlns:r="http://schemas.openxmlformats.org/officeDocument/2006/relationships" xmlns:p1510="http://schemas.microsoft.com/office/powerpoint/2015/10/main"/>
+</file>
+
 <file path=ppt/slideLayouts/slideLayout1.xml><?xml version="1.0" encoding="utf-8"?>
 <p:sldLayout xmlns:a="http://schemas.openxmlformats.org/drawingml/2006/main" xmlns:r="http://schemas.openxmlformats.org/officeDocument/2006/relationships" xmlns:p="http://schemas.openxmlformats.org/presentationml/2006/main" type="title" preserve="1">
   <p:cSld name="Title Slide">
@@ -247,7 +251,7 @@
           <a:p>
             <a:fld id="{B0EC7D9C-C39F-4904-9B8C-0ED70A370381}" type="datetimeFigureOut">
               <a:rPr lang="en-US" smtClean="0"/>
-              <a:t>4/17/2017</a:t>
+              <a:t>2/2/2018</a:t>
             </a:fld>
             <a:endParaRPr lang="en-US"/>
           </a:p>
@@ -415,7 +419,7 @@
           <a:p>
             <a:fld id="{B0EC7D9C-C39F-4904-9B8C-0ED70A370381}" type="datetimeFigureOut">
               <a:rPr lang="en-US" smtClean="0"/>
-              <a:t>4/17/2017</a:t>
+              <a:t>2/2/2018</a:t>
             </a:fld>
             <a:endParaRPr lang="en-US"/>
           </a:p>
@@ -593,7 +597,7 @@
           <a:p>
             <a:fld id="{B0EC7D9C-C39F-4904-9B8C-0ED70A370381}" type="datetimeFigureOut">
               <a:rPr lang="en-US" smtClean="0"/>
-              <a:t>4/17/2017</a:t>
+              <a:t>2/2/2018</a:t>
             </a:fld>
             <a:endParaRPr lang="en-US"/>
           </a:p>
@@ -761,7 +765,7 @@
           <a:p>
             <a:fld id="{B0EC7D9C-C39F-4904-9B8C-0ED70A370381}" type="datetimeFigureOut">
               <a:rPr lang="en-US" smtClean="0"/>
-              <a:t>4/17/2017</a:t>
+              <a:t>2/2/2018</a:t>
             </a:fld>
             <a:endParaRPr lang="en-US"/>
           </a:p>
@@ -1006,7 +1010,7 @@
           <a:p>
             <a:fld id="{B0EC7D9C-C39F-4904-9B8C-0ED70A370381}" type="datetimeFigureOut">
               <a:rPr lang="en-US" smtClean="0"/>
-              <a:t>4/17/2017</a:t>
+              <a:t>2/2/2018</a:t>
             </a:fld>
             <a:endParaRPr lang="en-US"/>
           </a:p>
@@ -1235,7 +1239,7 @@
           <a:p>
             <a:fld id="{B0EC7D9C-C39F-4904-9B8C-0ED70A370381}" type="datetimeFigureOut">
               <a:rPr lang="en-US" smtClean="0"/>
-              <a:t>4/17/2017</a:t>
+              <a:t>2/2/2018</a:t>
             </a:fld>
             <a:endParaRPr lang="en-US"/>
           </a:p>
@@ -1599,7 +1603,7 @@
           <a:p>
             <a:fld id="{B0EC7D9C-C39F-4904-9B8C-0ED70A370381}" type="datetimeFigureOut">
               <a:rPr lang="en-US" smtClean="0"/>
-              <a:t>4/17/2017</a:t>
+              <a:t>2/2/2018</a:t>
             </a:fld>
             <a:endParaRPr lang="en-US"/>
           </a:p>
@@ -1716,7 +1720,7 @@
           <a:p>
             <a:fld id="{B0EC7D9C-C39F-4904-9B8C-0ED70A370381}" type="datetimeFigureOut">
               <a:rPr lang="en-US" smtClean="0"/>
-              <a:t>4/17/2017</a:t>
+              <a:t>2/2/2018</a:t>
             </a:fld>
             <a:endParaRPr lang="en-US"/>
           </a:p>
@@ -1811,7 +1815,7 @@
           <a:p>
             <a:fld id="{B0EC7D9C-C39F-4904-9B8C-0ED70A370381}" type="datetimeFigureOut">
               <a:rPr lang="en-US" smtClean="0"/>
-              <a:t>4/17/2017</a:t>
+              <a:t>2/2/2018</a:t>
             </a:fld>
             <a:endParaRPr lang="en-US"/>
           </a:p>
@@ -2086,7 +2090,7 @@
           <a:p>
             <a:fld id="{B0EC7D9C-C39F-4904-9B8C-0ED70A370381}" type="datetimeFigureOut">
               <a:rPr lang="en-US" smtClean="0"/>
-              <a:t>4/17/2017</a:t>
+              <a:t>2/2/2018</a:t>
             </a:fld>
             <a:endParaRPr lang="en-US"/>
           </a:p>
@@ -2338,7 +2342,7 @@
           <a:p>
             <a:fld id="{B0EC7D9C-C39F-4904-9B8C-0ED70A370381}" type="datetimeFigureOut">
               <a:rPr lang="en-US" smtClean="0"/>
-              <a:t>4/17/2017</a:t>
+              <a:t>2/2/2018</a:t>
             </a:fld>
             <a:endParaRPr lang="en-US"/>
           </a:p>
@@ -2549,7 +2553,7 @@
           <a:p>
             <a:fld id="{B0EC7D9C-C39F-4904-9B8C-0ED70A370381}" type="datetimeFigureOut">
               <a:rPr lang="en-US" smtClean="0"/>
-              <a:t>4/17/2017</a:t>
+              <a:t>2/2/2018</a:t>
             </a:fld>
             <a:endParaRPr lang="en-US"/>
           </a:p>
@@ -6607,10 +6611,10 @@
         </p:nvGrpSpPr>
         <p:grpSpPr>
           <a:xfrm>
-            <a:off x="-3467" y="0"/>
-            <a:ext cx="12184978" cy="6858000"/>
-            <a:chOff x="-3467" y="0"/>
-            <a:chExt cx="12184978" cy="6858000"/>
+            <a:off x="-1" y="9033"/>
+            <a:ext cx="12178232" cy="6848966"/>
+            <a:chOff x="-1" y="9033"/>
+            <a:chExt cx="12178232" cy="6848966"/>
           </a:xfrm>
         </p:grpSpPr>
         <p:grpSp>
@@ -6621,10 +6625,10 @@
           </p:nvGrpSpPr>
           <p:grpSpPr>
             <a:xfrm>
-              <a:off x="-3467" y="0"/>
-              <a:ext cx="12181698" cy="6858000"/>
-              <a:chOff x="-2215" y="5034983"/>
-              <a:chExt cx="7784516" cy="5041558"/>
+              <a:off x="-1" y="9033"/>
+              <a:ext cx="12178232" cy="6848966"/>
+              <a:chOff x="0" y="5041624"/>
+              <a:chExt cx="7782301" cy="5034917"/>
             </a:xfrm>
           </p:grpSpPr>
           <p:grpSp>
@@ -6635,10 +6639,10 @@
             </p:nvGrpSpPr>
             <p:grpSpPr>
               <a:xfrm>
-                <a:off x="-2215" y="5034983"/>
-                <a:ext cx="7784516" cy="5041558"/>
-                <a:chOff x="-2215" y="-6641"/>
-                <a:chExt cx="7784516" cy="5041558"/>
+                <a:off x="0" y="5041624"/>
+                <a:ext cx="7782301" cy="5034917"/>
+                <a:chOff x="0" y="0"/>
+                <a:chExt cx="7782301" cy="5034917"/>
               </a:xfrm>
             </p:grpSpPr>
             <p:sp>
@@ -6699,115 +6703,6 @@
             </p:sp>
             <p:sp>
               <p:nvSpPr>
-                <p:cNvPr id="47" name="Rectangle 46"/>
-                <p:cNvSpPr/>
-                <p:nvPr/>
-              </p:nvSpPr>
-              <p:spPr>
-                <a:xfrm>
-                  <a:off x="13195" y="1577633"/>
-                  <a:ext cx="1269745" cy="1149475"/>
-                </a:xfrm>
-                <a:prstGeom prst="rect">
-                  <a:avLst/>
-                </a:prstGeom>
-                <a:solidFill>
-                  <a:schemeClr val="bg1"/>
-                </a:solidFill>
-                <a:ln w="15875">
-                  <a:solidFill>
-                    <a:schemeClr val="tx1"/>
-                  </a:solidFill>
-                </a:ln>
-              </p:spPr>
-              <p:style>
-                <a:lnRef idx="2">
-                  <a:schemeClr val="accent1">
-                    <a:shade val="50000"/>
-                  </a:schemeClr>
-                </a:lnRef>
-                <a:fillRef idx="1">
-                  <a:schemeClr val="accent1"/>
-                </a:fillRef>
-                <a:effectRef idx="0">
-                  <a:schemeClr val="accent1"/>
-                </a:effectRef>
-                <a:fontRef idx="minor">
-                  <a:schemeClr val="lt1"/>
-                </a:fontRef>
-              </p:style>
-              <p:txBody>
-                <a:bodyPr rot="0" spcFirstLastPara="0" vertOverflow="overflow" horzOverflow="overflow" vert="horz" wrap="square" lIns="91440" tIns="45720" rIns="91440" bIns="45720" numCol="1" spcCol="0" rtlCol="0" fromWordArt="0" anchor="ctr" anchorCtr="0" forceAA="0" compatLnSpc="1">
-                  <a:prstTxWarp prst="textNoShape">
-                    <a:avLst/>
-                  </a:prstTxWarp>
-                  <a:noAutofit/>
-                </a:bodyPr>
-                <a:lstStyle/>
-                <a:p>
-                  <a:r>
-                    <a:rPr lang="en-US" sz="1200" b="1" dirty="0">
-                      <a:solidFill>
-                        <a:schemeClr val="tx1"/>
-                      </a:solidFill>
-                    </a:rPr>
-                    <a:t>Baseline: tot_baseline_cross_1</a:t>
-                  </a:r>
-                </a:p>
-                <a:p>
-                  <a:r>
-                    <a:rPr lang="en-US" sz="1200" b="1" dirty="0">
-                      <a:solidFill>
-                        <a:schemeClr val="tx1"/>
-                      </a:solidFill>
-                    </a:rPr>
-                    <a:t>High Goals: avg_auto_high_made_1/avg_auto_high_attempts_1/max_auto_high_made_1</a:t>
-                  </a:r>
-                </a:p>
-                <a:p>
-                  <a:r>
-                    <a:rPr lang="en-US" sz="1200" b="1" dirty="0">
-                      <a:solidFill>
-                        <a:schemeClr val="tx1"/>
-                      </a:solidFill>
-                    </a:rPr>
-                    <a:t>Low Goals: avg_auto_low_made_1/avg_auto_low_attempts_1/max_auto_low_made_1</a:t>
-                  </a:r>
-                </a:p>
-                <a:p>
-                  <a:r>
-                    <a:rPr lang="en-US" sz="1200" b="1" dirty="0">
-                      <a:solidFill>
-                        <a:schemeClr val="tx1"/>
-                      </a:solidFill>
-                    </a:rPr>
-                    <a:t>Hopper Intake: avg_auto_hopper_intake_1</a:t>
-                  </a:r>
-                </a:p>
-                <a:p>
-                  <a:r>
-                    <a:rPr lang="en-US" sz="1200" b="1" dirty="0">
-                      <a:solidFill>
-                        <a:schemeClr val="tx1"/>
-                      </a:solidFill>
-                    </a:rPr>
-                    <a:t>Gears Scored FMB: tot_auto_gears_scored_fdr_1/tot_auto_gears_scored_mid_1/tot_auto_gears_scored_boi_1</a:t>
-                  </a:r>
-                </a:p>
-                <a:p>
-                  <a:r>
-                    <a:rPr lang="en-US" sz="1200" b="1" dirty="0">
-                      <a:solidFill>
-                        <a:schemeClr val="tx1"/>
-                      </a:solidFill>
-                    </a:rPr>
-                    <a:t>Gears Scored Tot: tot_auto_gears_scored_1/tot_auto_gears_attempts_1/max_auto_gears_scored_1</a:t>
-                  </a:r>
-                </a:p>
-              </p:txBody>
-            </p:sp>
-            <p:sp>
-              <p:nvSpPr>
                 <p:cNvPr id="48" name="Rectangle 47"/>
                 <p:cNvSpPr/>
                 <p:nvPr/>
@@ -6867,8 +6762,8 @@
               </p:nvSpPr>
               <p:spPr>
                 <a:xfrm>
-                  <a:off x="6598" y="5717"/>
-                  <a:ext cx="2280176" cy="584775"/>
+                  <a:off x="1215096" y="38580"/>
+                  <a:ext cx="1457109" cy="429889"/>
                 </a:xfrm>
                 <a:prstGeom prst="rect">
                   <a:avLst/>
@@ -6881,6 +6776,7 @@
                 </a:bodyPr>
                 <a:lstStyle/>
                 <a:p>
+                  <a:pPr algn="ctr"/>
                   <a:r>
                     <a:rPr lang="en-US" sz="3200" b="1" dirty="0">
                       <a:solidFill>
@@ -6900,8 +6796,8 @@
               </p:nvSpPr>
               <p:spPr>
                 <a:xfrm>
-                  <a:off x="4754636" y="-6641"/>
-                  <a:ext cx="2387192" cy="584775"/>
+                  <a:off x="5070847" y="38581"/>
+                  <a:ext cx="1525496" cy="429889"/>
                 </a:xfrm>
                 <a:prstGeom prst="rect">
                   <a:avLst/>
@@ -6914,6 +6810,7 @@
                 </a:bodyPr>
                 <a:lstStyle/>
                 <a:p>
+                  <a:pPr algn="ctr"/>
                   <a:r>
                     <a:rPr lang="en-US" sz="3200" b="1" dirty="0">
                       <a:solidFill>
@@ -6969,7 +6866,7 @@
               <p:spPr>
                 <a:xfrm>
                   <a:off x="6598" y="592197"/>
-                  <a:ext cx="1298331" cy="268883"/>
+                  <a:ext cx="1277438" cy="268883"/>
                 </a:xfrm>
                 <a:prstGeom prst="rect">
                   <a:avLst/>
@@ -7010,7 +6907,7 @@
                 <a:p>
                   <a:pPr algn="ctr"/>
                   <a:r>
-                    <a:rPr lang="en-US" sz="1200" b="1" dirty="0">
+                    <a:rPr lang="en-US" sz="800" b="1" dirty="0">
                       <a:solidFill>
                         <a:schemeClr val="tx1"/>
                       </a:solidFill>
@@ -7028,7 +6925,7 @@
               </p:nvSpPr>
               <p:spPr>
                 <a:xfrm>
-                  <a:off x="-2215" y="867486"/>
+                  <a:off x="7860" y="867486"/>
                   <a:ext cx="1285140" cy="268883"/>
                 </a:xfrm>
                 <a:prstGeom prst="rect">
@@ -7070,28 +6967,152 @@
                 <a:p>
                   <a:pPr algn="ctr"/>
                   <a:r>
-                    <a:rPr lang="en-US" sz="1200" b="1" dirty="0">
-                      <a:solidFill>
-                        <a:schemeClr val="tx1"/>
-                      </a:solidFill>
-                    </a:rPr>
-                    <a:t>Avg. </a:t>
-                  </a:r>
-                  <a:r>
-                    <a:rPr lang="en-US" sz="1200" b="1" dirty="0" err="1">
-                      <a:solidFill>
-                        <a:schemeClr val="tx1"/>
-                      </a:solidFill>
-                    </a:rPr>
-                    <a:t>kPa</a:t>
-                  </a:r>
-                  <a:r>
-                    <a:rPr lang="en-US" sz="1200" b="1" dirty="0">
-                      <a:solidFill>
-                        <a:schemeClr val="tx1"/>
-                      </a:solidFill>
-                    </a:rPr>
-                    <a:t>: avg_auto_contrib_kpa_1/avg_contrib_kpa_1/max_contrib_kpa_1</a:t>
+                    <a:rPr lang="en-US" sz="800" b="1" dirty="0">
+                      <a:solidFill>
+                        <a:schemeClr val="tx1"/>
+                      </a:solidFill>
+                    </a:rPr>
+                    <a:t>Avg. Intake: avg_tele_intake_1/max_tele_intake_1</a:t>
+                  </a:r>
+                </a:p>
+                <a:p>
+                  <a:pPr algn="ctr"/>
+                  <a:r>
+                    <a:rPr lang="en-US" sz="800" b="1" dirty="0">
+                      <a:solidFill>
+                        <a:schemeClr val="tx1"/>
+                      </a:solidFill>
+                    </a:rPr>
+                    <a:t>Avg. Intake: avg_tele_cubes_scored_1/max_tele_cubes_scored_1</a:t>
+                  </a:r>
+                </a:p>
+              </p:txBody>
+            </p:sp>
+            <p:sp>
+              <p:nvSpPr>
+                <p:cNvPr id="47" name="Rectangle 46"/>
+                <p:cNvSpPr/>
+                <p:nvPr/>
+              </p:nvSpPr>
+              <p:spPr>
+                <a:xfrm>
+                  <a:off x="13195" y="1577633"/>
+                  <a:ext cx="1269745" cy="1149475"/>
+                </a:xfrm>
+                <a:prstGeom prst="rect">
+                  <a:avLst/>
+                </a:prstGeom>
+                <a:solidFill>
+                  <a:schemeClr val="bg1"/>
+                </a:solidFill>
+                <a:ln w="15875">
+                  <a:solidFill>
+                    <a:schemeClr val="tx1"/>
+                  </a:solidFill>
+                </a:ln>
+              </p:spPr>
+              <p:style>
+                <a:lnRef idx="2">
+                  <a:schemeClr val="accent1">
+                    <a:shade val="50000"/>
+                  </a:schemeClr>
+                </a:lnRef>
+                <a:fillRef idx="1">
+                  <a:schemeClr val="accent1"/>
+                </a:fillRef>
+                <a:effectRef idx="0">
+                  <a:schemeClr val="accent1"/>
+                </a:effectRef>
+                <a:fontRef idx="minor">
+                  <a:schemeClr val="lt1"/>
+                </a:fontRef>
+              </p:style>
+              <p:txBody>
+                <a:bodyPr rot="0" spcFirstLastPara="0" vertOverflow="overflow" horzOverflow="overflow" vert="horz" wrap="square" lIns="91440" tIns="45720" rIns="91440" bIns="45720" numCol="1" spcCol="0" rtlCol="0" fromWordArt="0" anchor="ctr" anchorCtr="0" forceAA="0" compatLnSpc="1">
+                  <a:prstTxWarp prst="textNoShape">
+                    <a:avLst/>
+                  </a:prstTxWarp>
+                  <a:noAutofit/>
+                </a:bodyPr>
+                <a:lstStyle/>
+                <a:p>
+                  <a:r>
+                    <a:rPr lang="en-US" sz="800" b="1" dirty="0">
+                      <a:solidFill>
+                        <a:schemeClr val="tx1"/>
+                      </a:solidFill>
+                    </a:rPr>
+                    <a:t>Cross: tot_auto_cross_1</a:t>
+                  </a:r>
+                </a:p>
+                <a:p>
+                  <a:r>
+                    <a:rPr lang="en-US" sz="800" b="1" dirty="0">
+                      <a:solidFill>
+                        <a:schemeClr val="tx1"/>
+                      </a:solidFill>
+                    </a:rPr>
+                    <a:t>High Scale: tot_auto_scale_high_made_1/tot_auto_scale_high_attempts_1</a:t>
+                  </a:r>
+                </a:p>
+                <a:p>
+                  <a:r>
+                    <a:rPr lang="en-US" sz="800" b="1" dirty="0">
+                      <a:solidFill>
+                        <a:schemeClr val="tx1"/>
+                      </a:solidFill>
+                    </a:rPr>
+                    <a:t>Low Scale: tot_auto_scale_low_made_1/tot_auto_scale_low_attempts_1</a:t>
+                  </a:r>
+                </a:p>
+                <a:p>
+                  <a:r>
+                    <a:rPr lang="en-US" sz="800" b="1" dirty="0">
+                      <a:solidFill>
+                        <a:schemeClr val="tx1"/>
+                      </a:solidFill>
+                    </a:rPr>
+                    <a:t>Near Switch: tot_auto_near_switch_made_1/tot_auto_near_switch_attempts_1</a:t>
+                  </a:r>
+                </a:p>
+                <a:p>
+                  <a:r>
+                    <a:rPr lang="en-US" sz="800" b="1" dirty="0">
+                      <a:solidFill>
+                        <a:schemeClr val="tx1"/>
+                      </a:solidFill>
+                    </a:rPr>
+                    <a:t>Exchange: tot_auto_exchange_made_1/tot_auto_exchange_attempts_1</a:t>
+                  </a:r>
+                </a:p>
+                <a:p>
+                  <a:r>
+                    <a:rPr lang="en-US" sz="800" b="1" dirty="0">
+                      <a:solidFill>
+                        <a:schemeClr val="tx1"/>
+                      </a:solidFill>
+                    </a:rPr>
+                    <a:t>Pyramid Intake: tot_auto_pyramid_intake_1</a:t>
+                  </a:r>
+                </a:p>
+                <a:p>
+                  <a:r>
+                    <a:rPr lang="en-US" sz="800" b="1" dirty="0">
+                      <a:solidFill>
+                        <a:schemeClr val="tx1"/>
+                      </a:solidFill>
+                    </a:rPr>
+                    <a:t>Unprotected Intake: tot_auto_unprotected_intake_1</a:t>
+                  </a:r>
+                </a:p>
+                <a:p>
+                  <a:r>
+                    <a:rPr lang="en-US" sz="800" b="1" dirty="0">
+                      <a:solidFill>
+                        <a:schemeClr val="tx1"/>
+                      </a:solidFill>
+                    </a:rPr>
+                    <a:t>Starts LMR: tot_auto_left_1/tot_auto_center_1/tot_auto_right_1</a:t>
                   </a:r>
                 </a:p>
               </p:txBody>
@@ -7150,12 +7171,12 @@
                     </a:spcBef>
                   </a:pPr>
                   <a:r>
-                    <a:rPr lang="en-US" sz="1200" b="1" dirty="0">
-                      <a:solidFill>
-                        <a:schemeClr val="tx1"/>
-                      </a:solidFill>
-                    </a:rPr>
-                    <a:t>High Goals: avg_tele_high_made_1/avg_tele_high_attempts_1/max_tele_high_made_1</a:t>
+                    <a:rPr lang="en-US" sz="800" b="1" dirty="0">
+                      <a:solidFill>
+                        <a:schemeClr val="tx1"/>
+                      </a:solidFill>
+                    </a:rPr>
+                    <a:t>Exchange: avg_tele_exchange_made_1/avg_tele_exchange_attempts_1</a:t>
                   </a:r>
                 </a:p>
                 <a:p>
@@ -7165,12 +7186,12 @@
                     </a:spcBef>
                   </a:pPr>
                   <a:r>
-                    <a:rPr lang="en-US" sz="1200" b="1" dirty="0">
-                      <a:solidFill>
-                        <a:schemeClr val="tx1"/>
-                      </a:solidFill>
-                    </a:rPr>
-                    <a:t>Low Goals: avg_tele_low_made_1/avg_tele_low_attempts_1/max_tele_low_made_1</a:t>
+                    <a:rPr lang="en-US" sz="800" b="1" dirty="0">
+                      <a:solidFill>
+                        <a:schemeClr val="tx1"/>
+                      </a:solidFill>
+                    </a:rPr>
+                    <a:t>Near Switch: avg_tele_near_switch_made_1/avg_tele_near_switch_attempts_1</a:t>
                   </a:r>
                 </a:p>
                 <a:p>
@@ -7180,12 +7201,12 @@
                     </a:spcBef>
                   </a:pPr>
                   <a:r>
-                    <a:rPr lang="en-US" sz="1200" b="1" dirty="0">
-                      <a:solidFill>
-                        <a:schemeClr val="tx1"/>
-                      </a:solidFill>
-                    </a:rPr>
-                    <a:t>Gears Scored: avg_tele_gears_scored_1/avg_tele_gears_attempts_1/max_tele_gears_scored_1</a:t>
+                    <a:rPr lang="en-US" sz="800" b="1" dirty="0">
+                      <a:solidFill>
+                        <a:schemeClr val="tx1"/>
+                      </a:solidFill>
+                    </a:rPr>
+                    <a:t>Far Switch: avg_tele_far_switch_made_1/avg_tele_far_switch_attempts_1</a:t>
                   </a:r>
                 </a:p>
                 <a:p>
@@ -7195,12 +7216,12 @@
                     </a:spcBef>
                   </a:pPr>
                   <a:r>
-                    <a:rPr lang="en-US" sz="1200" b="1" dirty="0">
-                      <a:solidFill>
-                        <a:schemeClr val="tx1"/>
-                      </a:solidFill>
-                    </a:rPr>
-                    <a:t>Gears KO: tot_tele_gear_knockouts_1</a:t>
+                    <a:rPr lang="en-US" sz="800" b="1" dirty="0">
+                      <a:solidFill>
+                        <a:schemeClr val="tx1"/>
+                      </a:solidFill>
+                    </a:rPr>
+                    <a:t>Scale High: avg_tele_scale_high_made_1/avg_tele_scale_high_attempts_1</a:t>
                   </a:r>
                 </a:p>
                 <a:p>
@@ -7209,11 +7230,14 @@
                       <a:spcPts val="10"/>
                     </a:spcBef>
                   </a:pPr>
-                  <a:endParaRPr lang="en-US" sz="1200" b="1" dirty="0">
-                    <a:solidFill>
-                      <a:schemeClr val="tx1"/>
-                    </a:solidFill>
-                  </a:endParaRPr>
+                  <a:r>
+                    <a:rPr lang="en-US" sz="800" b="1" dirty="0">
+                      <a:solidFill>
+                        <a:schemeClr val="tx1"/>
+                      </a:solidFill>
+                    </a:rPr>
+                    <a:t>Scale Low: avg_tele_scale_low_made_1/avg_tele_scale_low_attempts_1</a:t>
+                  </a:r>
                 </a:p>
                 <a:p>
                   <a:pPr>
@@ -7221,14 +7245,11 @@
                       <a:spcPts val="10"/>
                     </a:spcBef>
                   </a:pPr>
-                  <a:r>
-                    <a:rPr lang="en-US" sz="1200" b="1" dirty="0">
-                      <a:solidFill>
-                        <a:schemeClr val="tx1"/>
-                      </a:solidFill>
-                    </a:rPr>
-                    <a:t>Floor Ball Intake: avg_tele_floor_ball_intake_1</a:t>
-                  </a:r>
+                  <a:endParaRPr lang="en-US" sz="800" b="1" dirty="0">
+                    <a:solidFill>
+                      <a:schemeClr val="tx1"/>
+                    </a:solidFill>
+                  </a:endParaRPr>
                 </a:p>
                 <a:p>
                   <a:pPr>
@@ -7237,12 +7258,12 @@
                     </a:spcBef>
                   </a:pPr>
                   <a:r>
-                    <a:rPr lang="en-US" sz="1200" b="1" dirty="0">
-                      <a:solidFill>
-                        <a:schemeClr val="tx1"/>
-                      </a:solidFill>
-                    </a:rPr>
-                    <a:t>Hopper Ball Intake: avg_tele_hopper_intake_1</a:t>
+                    <a:rPr lang="en-US" sz="800" b="1" dirty="0">
+                      <a:solidFill>
+                        <a:schemeClr val="tx1"/>
+                      </a:solidFill>
+                    </a:rPr>
+                    <a:t>Portal Intake: avg_tele_portal_intake_made_1/avg_tele_portal_intake_attempts_1</a:t>
                   </a:r>
                 </a:p>
                 <a:p>
@@ -7252,12 +7273,12 @@
                     </a:spcBef>
                   </a:pPr>
                   <a:r>
-                    <a:rPr lang="en-US" sz="1200" b="1" dirty="0">
-                      <a:solidFill>
-                        <a:schemeClr val="tx1"/>
-                      </a:solidFill>
-                    </a:rPr>
-                    <a:t>Floor Gear Intake: avg_tele_floor_gear_intake_1</a:t>
+                    <a:rPr lang="en-US" sz="800" b="1" dirty="0">
+                      <a:solidFill>
+                        <a:schemeClr val="tx1"/>
+                      </a:solidFill>
+                    </a:rPr>
+                    <a:t>Pyramid Intake: avg_tele_pyramid_intake_1</a:t>
                   </a:r>
                 </a:p>
                 <a:p>
@@ -7267,12 +7288,12 @@
                     </a:spcBef>
                   </a:pPr>
                   <a:r>
-                    <a:rPr lang="en-US" sz="1200" b="1" dirty="0">
-                      <a:solidFill>
-                        <a:schemeClr val="tx1"/>
-                      </a:solidFill>
-                    </a:rPr>
-                    <a:t>HP Gear Intake: avg_hp_gear_intake_1/avg_hp_gear_intake_miss_1</a:t>
+                    <a:rPr lang="en-US" sz="800" b="1" dirty="0">
+                      <a:solidFill>
+                        <a:schemeClr val="tx1"/>
+                      </a:solidFill>
+                    </a:rPr>
+                    <a:t>Unprotected Intake: avg_tele_unprotected_intake_1</a:t>
                   </a:r>
                 </a:p>
                 <a:p>
@@ -7281,11 +7302,14 @@
                       <a:spcPts val="10"/>
                     </a:spcBef>
                   </a:pPr>
-                  <a:endParaRPr lang="en-US" sz="1200" b="1" dirty="0">
-                    <a:solidFill>
-                      <a:schemeClr val="tx1"/>
-                    </a:solidFill>
-                  </a:endParaRPr>
+                  <a:r>
+                    <a:rPr lang="en-US" sz="800" b="1" dirty="0">
+                      <a:solidFill>
+                        <a:schemeClr val="tx1"/>
+                      </a:solidFill>
+                    </a:rPr>
+                    <a:t>Floor Intake: avg_tele_floor_intake_1</a:t>
+                  </a:r>
                 </a:p>
                 <a:p>
                   <a:pPr>
@@ -7293,14 +7317,11 @@
                       <a:spcPts val="10"/>
                     </a:spcBef>
                   </a:pPr>
-                  <a:r>
-                    <a:rPr lang="en-US" sz="1200" b="1" dirty="0">
-                      <a:solidFill>
-                        <a:schemeClr val="tx1"/>
-                      </a:solidFill>
-                    </a:rPr>
-                    <a:t>Climb: tot_climb_1/tot_climb_attempts_1</a:t>
-                  </a:r>
+                  <a:endParaRPr lang="en-US" sz="800" b="1" dirty="0">
+                    <a:solidFill>
+                      <a:schemeClr val="tx1"/>
+                    </a:solidFill>
+                  </a:endParaRPr>
                 </a:p>
                 <a:p>
                   <a:pPr>
@@ -7309,12 +7330,12 @@
                     </a:spcBef>
                   </a:pPr>
                   <a:r>
-                    <a:rPr lang="en-US" sz="1200" b="1" dirty="0">
-                      <a:solidFill>
-                        <a:schemeClr val="tx1"/>
-                      </a:solidFill>
-                    </a:rPr>
-                    <a:t>Defense: avg_defense_rating_1</a:t>
+                    <a:rPr lang="en-US" sz="800" b="1" dirty="0">
+                      <a:solidFill>
+                        <a:schemeClr val="tx1"/>
+                      </a:solidFill>
+                    </a:rPr>
+                    <a:t>Knockouts: avg_tele_knockouts_1</a:t>
                   </a:r>
                 </a:p>
                 <a:p>
@@ -7324,12 +7345,144 @@
                     </a:spcBef>
                   </a:pPr>
                   <a:r>
-                    <a:rPr lang="en-US" sz="1200" b="1" dirty="0">
+                    <a:rPr lang="en-US" sz="800" b="1" dirty="0">
+                      <a:solidFill>
+                        <a:schemeClr val="tx1"/>
+                      </a:solidFill>
+                    </a:rPr>
+                    <a:t>Cubes Dropped: avg_tele_cubes_dropped_1</a:t>
+                  </a:r>
+                </a:p>
+                <a:p>
+                  <a:pPr>
+                    <a:spcBef>
+                      <a:spcPts val="10"/>
+                    </a:spcBef>
+                  </a:pPr>
+                  <a:r>
+                    <a:rPr lang="en-US" sz="800" b="1" dirty="0">
+                      <a:solidFill>
+                        <a:schemeClr val="tx1"/>
+                      </a:solidFill>
+                    </a:rPr>
+                    <a:t>Orderly: tot_tele_orderly_1</a:t>
+                  </a:r>
+                </a:p>
+                <a:p>
+                  <a:pPr>
+                    <a:spcBef>
+                      <a:spcPts val="10"/>
+                    </a:spcBef>
+                  </a:pPr>
+                  <a:r>
+                    <a:rPr lang="en-US" sz="800" b="1" dirty="0">
+                      <a:solidFill>
+                        <a:schemeClr val="tx1"/>
+                      </a:solidFill>
+                    </a:rPr>
+                    <a:t>Highest Level: max_tele_highest_level_1</a:t>
+                  </a:r>
+                </a:p>
+                <a:p>
+                  <a:pPr>
+                    <a:spcBef>
+                      <a:spcPts val="10"/>
+                    </a:spcBef>
+                  </a:pPr>
+                  <a:endParaRPr lang="en-US" sz="800" b="1" dirty="0">
+                    <a:solidFill>
+                      <a:schemeClr val="tx1"/>
+                    </a:solidFill>
+                  </a:endParaRPr>
+                </a:p>
+                <a:p>
+                  <a:pPr>
+                    <a:spcBef>
+                      <a:spcPts val="10"/>
+                    </a:spcBef>
+                  </a:pPr>
+                  <a:r>
+                    <a:rPr lang="en-US" sz="800" b="1" dirty="0">
+                      <a:solidFill>
+                        <a:schemeClr val="tx1"/>
+                      </a:solidFill>
+                    </a:rPr>
+                    <a:t>Climb: tot_tele_climb_1/tot_tele_climb_attempts_1</a:t>
+                  </a:r>
+                </a:p>
+                <a:p>
+                  <a:pPr>
+                    <a:spcBef>
+                      <a:spcPts val="10"/>
+                    </a:spcBef>
+                  </a:pPr>
+                  <a:r>
+                    <a:rPr lang="en-US" sz="800" b="1" dirty="0">
+                      <a:solidFill>
+                        <a:schemeClr val="tx1"/>
+                      </a:solidFill>
+                    </a:rPr>
+                    <a:t>Assisted: tot_tele_climb_assisted_1</a:t>
+                  </a:r>
+                </a:p>
+                <a:p>
+                  <a:pPr>
+                    <a:spcBef>
+                      <a:spcPts val="10"/>
+                    </a:spcBef>
+                  </a:pPr>
+                  <a:r>
+                    <a:rPr lang="en-US" sz="800" b="1" dirty="0">
+                      <a:solidFill>
+                        <a:schemeClr val="tx1"/>
+                      </a:solidFill>
+                    </a:rPr>
+                    <a:t>Plus One: tot_tele_plus_one_1/tot_tele_plus_one_attempts_1</a:t>
+                  </a:r>
+                </a:p>
+                <a:p>
+                  <a:pPr>
+                    <a:spcBef>
+                      <a:spcPts val="10"/>
+                    </a:spcBef>
+                  </a:pPr>
+                  <a:r>
+                    <a:rPr lang="en-US" sz="800" b="1" dirty="0">
+                      <a:solidFill>
+                        <a:schemeClr val="tx1"/>
+                      </a:solidFill>
+                    </a:rPr>
+                    <a:t>Plus Two: tot_tele_plus_two_1/tot_tele_plus_two_attempts_1</a:t>
+                  </a:r>
+                </a:p>
+                <a:p>
+                  <a:pPr>
+                    <a:spcBef>
+                      <a:spcPts val="10"/>
+                    </a:spcBef>
+                  </a:pPr>
+                  <a:r>
+                    <a:rPr lang="en-US" sz="800" b="1" dirty="0">
                       <a:solidFill>
                         <a:schemeClr val="tx1"/>
                       </a:solidFill>
                     </a:rPr>
                     <a:t>Mobility: avg_mobility_rating_1</a:t>
+                  </a:r>
+                </a:p>
+                <a:p>
+                  <a:pPr>
+                    <a:spcBef>
+                      <a:spcPts val="10"/>
+                    </a:spcBef>
+                  </a:pPr>
+                  <a:r>
+                    <a:rPr lang="en-US" sz="800" b="1" dirty="0">
+                      <a:solidFill>
+                        <a:schemeClr val="tx1"/>
+                      </a:solidFill>
+                    </a:rPr>
+                    <a:t>Defense: avg_defense_rating_1</a:t>
                   </a:r>
                 </a:p>
               </p:txBody>
@@ -7342,8 +7495,8 @@
               </p:nvSpPr>
               <p:spPr>
                 <a:xfrm>
-                  <a:off x="1287340" y="590491"/>
-                  <a:ext cx="1298331" cy="268883"/>
+                  <a:off x="1280736" y="590491"/>
+                  <a:ext cx="1269719" cy="268883"/>
                 </a:xfrm>
                 <a:prstGeom prst="rect">
                   <a:avLst/>
@@ -7384,7 +7537,7 @@
                 <a:p>
                   <a:pPr algn="ctr"/>
                   <a:r>
-                    <a:rPr lang="en-US" sz="1200" b="1" dirty="0">
+                    <a:rPr lang="en-US" sz="800" b="1" dirty="0">
                       <a:solidFill>
                         <a:schemeClr val="tx1"/>
                       </a:solidFill>
@@ -7402,8 +7555,8 @@
               </p:nvSpPr>
               <p:spPr>
                 <a:xfrm>
-                  <a:off x="2585671" y="590491"/>
-                  <a:ext cx="1307129" cy="268883"/>
+                  <a:off x="2550456" y="590491"/>
+                  <a:ext cx="1338730" cy="268883"/>
                 </a:xfrm>
                 <a:prstGeom prst="rect">
                   <a:avLst/>
@@ -7444,7 +7597,7 @@
                 <a:p>
                   <a:pPr algn="ctr"/>
                   <a:r>
-                    <a:rPr lang="en-US" sz="1200" b="1" dirty="0">
+                    <a:rPr lang="en-US" sz="800" b="1" dirty="0">
                       <a:solidFill>
                         <a:schemeClr val="tx1"/>
                       </a:solidFill>
@@ -7524,8 +7677,8 @@
               </p:nvSpPr>
               <p:spPr>
                 <a:xfrm>
-                  <a:off x="1282940" y="1574577"/>
-                  <a:ext cx="1269745" cy="1149475"/>
+                  <a:off x="1282940" y="1576285"/>
+                  <a:ext cx="1269745" cy="1159357"/>
                 </a:xfrm>
                 <a:prstGeom prst="rect">
                   <a:avLst/>
@@ -7565,70 +7718,83 @@
                 <a:lstStyle/>
                 <a:p>
                   <a:r>
-                    <a:rPr lang="en-US" sz="1200" b="1" dirty="0">
-                      <a:solidFill>
-                        <a:schemeClr val="tx1"/>
-                      </a:solidFill>
-                    </a:rPr>
-                    <a:t>Baseline: tot_baseline_cross_2</a:t>
-                  </a:r>
-                </a:p>
-                <a:p>
-                  <a:r>
-                    <a:rPr lang="en-US" sz="1200" b="1" dirty="0">
-                      <a:solidFill>
-                        <a:schemeClr val="tx1"/>
-                      </a:solidFill>
-                    </a:rPr>
-                    <a:t>High Goals: avg_auto_high_made_2/avg_auto_high_attempts_2/max_auto_high_made_2</a:t>
-                  </a:r>
-                </a:p>
-                <a:p>
-                  <a:r>
-                    <a:rPr lang="en-US" sz="1200" b="1" dirty="0">
-                      <a:solidFill>
-                        <a:schemeClr val="tx1"/>
-                      </a:solidFill>
-                    </a:rPr>
-                    <a:t>Low Goals: avg_auto_low_made_2/avg_auto_low_attempts_2/max_auto_low_made_2</a:t>
-                  </a:r>
-                </a:p>
-                <a:p>
-                  <a:r>
-                    <a:rPr lang="en-US" sz="1200" b="1" dirty="0">
-                      <a:solidFill>
-                        <a:schemeClr val="tx1"/>
-                      </a:solidFill>
-                    </a:rPr>
-                    <a:t>Hopper Intake: avg_auto_hopper_intake_2</a:t>
-                  </a:r>
-                </a:p>
-                <a:p>
-                  <a:r>
-                    <a:rPr lang="en-US" sz="1200" b="1" dirty="0">
-                      <a:solidFill>
-                        <a:schemeClr val="tx1"/>
-                      </a:solidFill>
-                    </a:rPr>
-                    <a:t>Gears Scored FMB: tot_auto_gears_scored_fdr_2/tot_auto_gears_scored_mid_2/tot_auto_gears_scored_boi_2</a:t>
-                  </a:r>
-                </a:p>
-                <a:p>
-                  <a:r>
-                    <a:rPr lang="en-US" sz="1200" b="1" dirty="0">
-                      <a:solidFill>
-                        <a:schemeClr val="tx1"/>
-                      </a:solidFill>
-                    </a:rPr>
-                    <a:t>Gears Scored Tot: tot_auto_gears_scored_2/tot_auto_gears_attempts_2/max_auto_gears_scored_2</a:t>
-                  </a:r>
-                </a:p>
-                <a:p>
-                  <a:endParaRPr lang="en-US" sz="1200" b="1" dirty="0">
-                    <a:solidFill>
-                      <a:schemeClr val="tx1"/>
-                    </a:solidFill>
-                  </a:endParaRPr>
+                    <a:rPr lang="en-US" sz="800" b="1" dirty="0">
+                      <a:solidFill>
+                        <a:schemeClr val="tx1"/>
+                      </a:solidFill>
+                    </a:rPr>
+                    <a:t>Cross: tot_auto_cross_2</a:t>
+                  </a:r>
+                </a:p>
+                <a:p>
+                  <a:r>
+                    <a:rPr lang="en-US" sz="800" b="1" dirty="0">
+                      <a:solidFill>
+                        <a:schemeClr val="tx1"/>
+                      </a:solidFill>
+                    </a:rPr>
+                    <a:t>High Scale: tot_auto_scale_high_made_2/tot_auto_scale_high_attempts_2</a:t>
+                  </a:r>
+                </a:p>
+                <a:p>
+                  <a:r>
+                    <a:rPr lang="en-US" sz="800" b="1" dirty="0">
+                      <a:solidFill>
+                        <a:schemeClr val="tx1"/>
+                      </a:solidFill>
+                    </a:rPr>
+                    <a:t>Low Scale: tot_auto_scale_low_made_2/tot_auto_scale_low_attempts_2</a:t>
+                  </a:r>
+                </a:p>
+                <a:p>
+                  <a:r>
+                    <a:rPr lang="en-US" sz="800" b="1" dirty="0">
+                      <a:solidFill>
+                        <a:schemeClr val="tx1"/>
+                      </a:solidFill>
+                    </a:rPr>
+                    <a:t>Near Switch: tot_auto_near_switch_made_2/tot_auto_near_switch_attempts_2</a:t>
+                  </a:r>
+                </a:p>
+                <a:p>
+                  <a:r>
+                    <a:rPr lang="en-US" sz="800" b="1" dirty="0">
+                      <a:solidFill>
+                        <a:schemeClr val="tx1"/>
+                      </a:solidFill>
+                    </a:rPr>
+                    <a:t>Exchange: tot_auto_exchange_made_2/tot_auto_exchange_attempts_2</a:t>
+                  </a:r>
+                </a:p>
+                <a:p>
+                  <a:r>
+                    <a:rPr lang="en-US" sz="800" b="1" dirty="0">
+                      <a:solidFill>
+                        <a:schemeClr val="tx1"/>
+                      </a:solidFill>
+                    </a:rPr>
+                    <a:t>Pyramid Intake: tot_auto_pyramid_intake_2</a:t>
+                  </a:r>
+                </a:p>
+                <a:p>
+                  <a:r>
+                    <a:rPr lang="en-US" sz="800" b="1" dirty="0">
+                      <a:solidFill>
+                        <a:schemeClr val="tx1"/>
+                      </a:solidFill>
+                    </a:rPr>
+                    <a:t>Unprotected Intake: tot_auto_unprotected_intake_2</a:t>
+                  </a:r>
+                </a:p>
+                <a:p>
+                  <a:r>
+                    <a:rPr lang="en-US" sz="800" b="1" dirty="0">
+                      <a:solidFill>
+                        <a:schemeClr val="tx1"/>
+                      </a:solidFill>
+                    </a:rPr>
+                    <a:t>Starts LMR: tot_auto_left_2/tot_auto_center_2/tot_auto_right_2</a:t>
+                  </a:r>
                 </a:p>
               </p:txBody>
             </p:sp>
@@ -7681,46 +7847,56 @@
                 <a:lstStyle/>
                 <a:p>
                   <a:r>
-                    <a:rPr lang="en-US" sz="1200" b="1" dirty="0">
-                      <a:solidFill>
-                        <a:schemeClr val="tx1"/>
-                      </a:solidFill>
-                    </a:rPr>
-                    <a:t>High Goals: avg_tele_high_made_2/avg_tele_high_attempts_2/max_tele_high_made_2</a:t>
-                  </a:r>
-                </a:p>
-                <a:p>
-                  <a:r>
-                    <a:rPr lang="en-US" sz="1200" b="1" dirty="0">
-                      <a:solidFill>
-                        <a:schemeClr val="tx1"/>
-                      </a:solidFill>
-                    </a:rPr>
-                    <a:t>Low Goals: avg_tele_low_made_2/avg_tele_low_attempts_2/max_tele_low_made_2</a:t>
-                  </a:r>
-                </a:p>
-                <a:p>
-                  <a:r>
-                    <a:rPr lang="en-US" sz="1200" b="1" dirty="0">
-                      <a:solidFill>
-                        <a:schemeClr val="tx1"/>
-                      </a:solidFill>
-                    </a:rPr>
-                    <a:t>Gears Scored: avg_tele_gears_scored_2/avg_tele_gears_attempts_2/max_tele_gears_scored_2</a:t>
-                  </a:r>
-                </a:p>
-                <a:p>
-                  <a:r>
-                    <a:rPr lang="en-US" sz="1200" b="1" dirty="0">
-                      <a:solidFill>
-                        <a:schemeClr val="tx1"/>
-                      </a:solidFill>
-                    </a:rPr>
-                    <a:t>Gears KO: tot_tele_gear_knockouts_2</a:t>
-                  </a:r>
-                </a:p>
-                <a:p>
-                  <a:endParaRPr lang="en-US" sz="1200" b="1" dirty="0">
+                    <a:rPr lang="en-US" sz="800" b="1" dirty="0">
+                      <a:solidFill>
+                        <a:schemeClr val="tx1"/>
+                      </a:solidFill>
+                    </a:rPr>
+                    <a:t>Exchange: avg_tele_exchange_made_2/avg_tele_exchange_attempts_2</a:t>
+                  </a:r>
+                </a:p>
+                <a:p>
+                  <a:r>
+                    <a:rPr lang="en-US" sz="800" b="1" dirty="0">
+                      <a:solidFill>
+                        <a:schemeClr val="tx1"/>
+                      </a:solidFill>
+                    </a:rPr>
+                    <a:t>Near Switch: avg_tele_near_switch_made_2/avg_tele_near_switch_attempts_2</a:t>
+                  </a:r>
+                </a:p>
+                <a:p>
+                  <a:r>
+                    <a:rPr lang="en-US" sz="800" b="1" dirty="0">
+                      <a:solidFill>
+                        <a:schemeClr val="tx1"/>
+                      </a:solidFill>
+                    </a:rPr>
+                    <a:t>Far Switch: avg_tele_far_switch_made_2/avg_tele_far_switch_attempts_2</a:t>
+                  </a:r>
+                </a:p>
+                <a:p>
+                  <a:r>
+                    <a:rPr lang="en-US" sz="800" b="1" dirty="0">
+                      <a:solidFill>
+                        <a:schemeClr val="tx1"/>
+                      </a:solidFill>
+                    </a:rPr>
+                    <a:t>Scale High: avg_tele_scale_high_made_2/avg_tele_scale_high_attempts_2</a:t>
+                  </a:r>
+                </a:p>
+                <a:p>
+                  <a:r>
+                    <a:rPr lang="en-US" sz="800" b="1" dirty="0">
+                      <a:solidFill>
+                        <a:schemeClr val="tx1"/>
+                      </a:solidFill>
+                    </a:rPr>
+                    <a:t>Scale Low: avg_tele_scale_low_made_2/avg_tele_scale_low_attempts_2</a:t>
+                  </a:r>
+                </a:p>
+                <a:p>
+                  <a:endParaRPr lang="en-US" sz="800" b="1" dirty="0">
                     <a:solidFill>
                       <a:schemeClr val="tx1"/>
                     </a:solidFill>
@@ -7728,46 +7904,46 @@
                 </a:p>
                 <a:p>
                   <a:r>
-                    <a:rPr lang="en-US" sz="1200" b="1" dirty="0">
-                      <a:solidFill>
-                        <a:schemeClr val="tx1"/>
-                      </a:solidFill>
-                    </a:rPr>
-                    <a:t>Floor Ball Intake: avg_tele_floor_ball_intake_2</a:t>
-                  </a:r>
-                </a:p>
-                <a:p>
-                  <a:r>
-                    <a:rPr lang="en-US" sz="1200" b="1" dirty="0">
-                      <a:solidFill>
-                        <a:schemeClr val="tx1"/>
-                      </a:solidFill>
-                    </a:rPr>
-                    <a:t>Hopper Ball Intake: avg_tele_hopper_intake_2</a:t>
-                  </a:r>
-                </a:p>
-                <a:p>
-                  <a:r>
-                    <a:rPr lang="en-US" sz="1200" b="1" dirty="0">
-                      <a:solidFill>
-                        <a:schemeClr val="tx1"/>
-                      </a:solidFill>
-                    </a:rPr>
-                    <a:t>Floor Gear Intake: avg_tele_floor_gear_intake_2</a:t>
-                  </a:r>
-                </a:p>
-                <a:p>
-                  <a:r>
-                    <a:rPr lang="en-US" sz="1200" b="1" dirty="0">
-                      <a:solidFill>
-                        <a:schemeClr val="tx1"/>
-                      </a:solidFill>
-                    </a:rPr>
-                    <a:t>HP Gear Intake: avg_hp_gear_intake_2/avg_hp_gear_intake_miss_2</a:t>
-                  </a:r>
-                </a:p>
-                <a:p>
-                  <a:endParaRPr lang="en-US" sz="1200" b="1" dirty="0">
+                    <a:rPr lang="en-US" sz="800" b="1" dirty="0">
+                      <a:solidFill>
+                        <a:schemeClr val="tx1"/>
+                      </a:solidFill>
+                    </a:rPr>
+                    <a:t>Portal Intake: avg_tele_portal_intake_made_2/avg_tele_portal_intake_attempts_2</a:t>
+                  </a:r>
+                </a:p>
+                <a:p>
+                  <a:r>
+                    <a:rPr lang="en-US" sz="800" b="1" dirty="0">
+                      <a:solidFill>
+                        <a:schemeClr val="tx1"/>
+                      </a:solidFill>
+                    </a:rPr>
+                    <a:t>Pyramid Intake: avg_tele_pyramid_intake_2</a:t>
+                  </a:r>
+                </a:p>
+                <a:p>
+                  <a:r>
+                    <a:rPr lang="en-US" sz="800" b="1" dirty="0">
+                      <a:solidFill>
+                        <a:schemeClr val="tx1"/>
+                      </a:solidFill>
+                    </a:rPr>
+                    <a:t>Unprotected Intake: avg_tele_unprotected_intake_2</a:t>
+                  </a:r>
+                </a:p>
+                <a:p>
+                  <a:r>
+                    <a:rPr lang="en-US" sz="800" b="1" dirty="0">
+                      <a:solidFill>
+                        <a:schemeClr val="tx1"/>
+                      </a:solidFill>
+                    </a:rPr>
+                    <a:t>Floor Intake: avg_tele_floor_intake_2</a:t>
+                  </a:r>
+                </a:p>
+                <a:p>
+                  <a:endParaRPr lang="en-US" sz="800" b="1" dirty="0">
                     <a:solidFill>
                       <a:schemeClr val="tx1"/>
                     </a:solidFill>
@@ -7775,32 +7951,109 @@
                 </a:p>
                 <a:p>
                   <a:r>
-                    <a:rPr lang="en-US" sz="1200" b="1" dirty="0">
-                      <a:solidFill>
-                        <a:schemeClr val="tx1"/>
-                      </a:solidFill>
-                    </a:rPr>
-                    <a:t>Climb: tot_climb_2/tot_climb_attempts_2</a:t>
-                  </a:r>
-                </a:p>
-                <a:p>
-                  <a:r>
-                    <a:rPr lang="en-US" sz="1200" b="1" dirty="0">
+                    <a:rPr lang="en-US" sz="800" b="1" dirty="0">
+                      <a:solidFill>
+                        <a:schemeClr val="tx1"/>
+                      </a:solidFill>
+                    </a:rPr>
+                    <a:t>Knockouts: avg_tele_knockouts_2</a:t>
+                  </a:r>
+                </a:p>
+                <a:p>
+                  <a:r>
+                    <a:rPr lang="en-US" sz="800" b="1" dirty="0">
+                      <a:solidFill>
+                        <a:schemeClr val="tx1"/>
+                      </a:solidFill>
+                    </a:rPr>
+                    <a:t>Cubes Dropped: avg_tele_cubes_dropped_2</a:t>
+                  </a:r>
+                </a:p>
+                <a:p>
+                  <a:r>
+                    <a:rPr lang="en-US" sz="800" b="1" dirty="0">
+                      <a:solidFill>
+                        <a:schemeClr val="tx1"/>
+                      </a:solidFill>
+                    </a:rPr>
+                    <a:t>Orderly: tot_tele_orderly_2</a:t>
+                  </a:r>
+                </a:p>
+                <a:p>
+                  <a:r>
+                    <a:rPr lang="en-US" sz="800" b="1" dirty="0">
+                      <a:solidFill>
+                        <a:schemeClr val="tx1"/>
+                      </a:solidFill>
+                    </a:rPr>
+                    <a:t>Highest Level: max_tele_highest_level_2</a:t>
+                  </a:r>
+                </a:p>
+                <a:p>
+                  <a:endParaRPr lang="en-US" sz="800" b="1" dirty="0">
+                    <a:solidFill>
+                      <a:schemeClr val="tx1"/>
+                    </a:solidFill>
+                  </a:endParaRPr>
+                </a:p>
+                <a:p>
+                  <a:r>
+                    <a:rPr lang="en-US" sz="800" b="1" dirty="0">
+                      <a:solidFill>
+                        <a:schemeClr val="tx1"/>
+                      </a:solidFill>
+                    </a:rPr>
+                    <a:t>Climb: tot_tele_climb_2/tot_tele_climb_attempts_2</a:t>
+                  </a:r>
+                </a:p>
+                <a:p>
+                  <a:r>
+                    <a:rPr lang="en-US" sz="800" b="1" dirty="0">
+                      <a:solidFill>
+                        <a:schemeClr val="tx1"/>
+                      </a:solidFill>
+                    </a:rPr>
+                    <a:t>Assisted: tot_tele_climb_assisted_2</a:t>
+                  </a:r>
+                </a:p>
+                <a:p>
+                  <a:r>
+                    <a:rPr lang="en-US" sz="800" b="1" dirty="0">
+                      <a:solidFill>
+                        <a:schemeClr val="tx1"/>
+                      </a:solidFill>
+                    </a:rPr>
+                    <a:t>Plus One: tot_tele_plus_one_2/tot_tele_plus_one_attempts_2</a:t>
+                  </a:r>
+                </a:p>
+                <a:p>
+                  <a:r>
+                    <a:rPr lang="en-US" sz="800" b="1" dirty="0">
+                      <a:solidFill>
+                        <a:schemeClr val="tx1"/>
+                      </a:solidFill>
+                    </a:rPr>
+                    <a:t>Plus Two: tot_tele_plus_two_2/tot_tele_plus_two_attempts_2</a:t>
+                  </a:r>
+                </a:p>
+                <a:p>
+                  <a:r>
+                    <a:rPr lang="en-US" sz="800" b="1" dirty="0">
+                      <a:solidFill>
+                        <a:schemeClr val="tx1"/>
+                      </a:solidFill>
+                    </a:rPr>
+                    <a:t>Mobility: avg_mobility_rating_2</a:t>
+                  </a:r>
+                </a:p>
+                <a:p>
+                  <a:r>
+                    <a:rPr lang="en-US" sz="800" b="1" dirty="0">
                       <a:solidFill>
                         <a:schemeClr val="tx1"/>
                       </a:solidFill>
                     </a:rPr>
                     <a:t>Defense: avg_defense_rating_2</a:t>
-                  </a:r>
-                </a:p>
-                <a:p>
-                  <a:r>
-                    <a:rPr lang="en-US" sz="1200" b="1" dirty="0">
-                      <a:solidFill>
-                        <a:schemeClr val="tx1"/>
-                      </a:solidFill>
-                    </a:rPr>
-                    <a:t>Mobility: avg_mobility_rating_2</a:t>
                   </a:r>
                 </a:p>
               </p:txBody>
@@ -7854,70 +8107,83 @@
                 <a:lstStyle/>
                 <a:p>
                   <a:r>
-                    <a:rPr lang="en-US" sz="1200" b="1" dirty="0">
-                      <a:solidFill>
-                        <a:schemeClr val="tx1"/>
-                      </a:solidFill>
-                    </a:rPr>
-                    <a:t>Baseline: tot_baseline_cross_3</a:t>
-                  </a:r>
-                </a:p>
-                <a:p>
-                  <a:r>
-                    <a:rPr lang="en-US" sz="1200" b="1" dirty="0">
-                      <a:solidFill>
-                        <a:schemeClr val="tx1"/>
-                      </a:solidFill>
-                    </a:rPr>
-                    <a:t>High Goals: avg_auto_high_made_3/avg_auto_high_attempts_3/max_auto_high_made_3</a:t>
-                  </a:r>
-                </a:p>
-                <a:p>
-                  <a:r>
-                    <a:rPr lang="en-US" sz="1200" b="1" dirty="0">
-                      <a:solidFill>
-                        <a:schemeClr val="tx1"/>
-                      </a:solidFill>
-                    </a:rPr>
-                    <a:t>Low Goals: avg_auto_low_made_3/avg_auto_low_attempts_3/max_auto_low_made_3</a:t>
-                  </a:r>
-                </a:p>
-                <a:p>
-                  <a:r>
-                    <a:rPr lang="en-US" sz="1200" b="1" dirty="0">
-                      <a:solidFill>
-                        <a:schemeClr val="tx1"/>
-                      </a:solidFill>
-                    </a:rPr>
-                    <a:t>Hopper Intake: avg_auto_hopper_intake_3</a:t>
-                  </a:r>
-                </a:p>
-                <a:p>
-                  <a:r>
-                    <a:rPr lang="en-US" sz="1200" b="1" dirty="0">
-                      <a:solidFill>
-                        <a:schemeClr val="tx1"/>
-                      </a:solidFill>
-                    </a:rPr>
-                    <a:t>Gears Scored FMB: tot_auto_gears_scored_fdr_3/tot_auto_gears_scored_mid_3/tot_auto_gears_scored_boi_3</a:t>
-                  </a:r>
-                </a:p>
-                <a:p>
-                  <a:r>
-                    <a:rPr lang="en-US" sz="1200" b="1" dirty="0">
-                      <a:solidFill>
-                        <a:schemeClr val="tx1"/>
-                      </a:solidFill>
-                    </a:rPr>
-                    <a:t>Gears Scored Tot: tot_auto_gears_scored_3/tot_auto_gears_attempts_3/max_auto_gears_scored_3</a:t>
-                  </a:r>
-                </a:p>
-                <a:p>
-                  <a:endParaRPr lang="en-US" sz="1200" b="1" dirty="0">
-                    <a:solidFill>
-                      <a:schemeClr val="tx1"/>
-                    </a:solidFill>
-                  </a:endParaRPr>
+                    <a:rPr lang="en-US" sz="800" b="1" dirty="0">
+                      <a:solidFill>
+                        <a:schemeClr val="tx1"/>
+                      </a:solidFill>
+                    </a:rPr>
+                    <a:t>Cross: tot_auto_cross_3</a:t>
+                  </a:r>
+                </a:p>
+                <a:p>
+                  <a:r>
+                    <a:rPr lang="en-US" sz="800" b="1" dirty="0">
+                      <a:solidFill>
+                        <a:schemeClr val="tx1"/>
+                      </a:solidFill>
+                    </a:rPr>
+                    <a:t>High Scale: tot_auto_scale_high_made_3/tot_auto_scale_high_attempts_3</a:t>
+                  </a:r>
+                </a:p>
+                <a:p>
+                  <a:r>
+                    <a:rPr lang="en-US" sz="800" b="1" dirty="0">
+                      <a:solidFill>
+                        <a:schemeClr val="tx1"/>
+                      </a:solidFill>
+                    </a:rPr>
+                    <a:t>Low Scale: tot_auto_scale_low_made_3/tot_auto_scale_low_attempts_3</a:t>
+                  </a:r>
+                </a:p>
+                <a:p>
+                  <a:r>
+                    <a:rPr lang="en-US" sz="800" b="1" dirty="0">
+                      <a:solidFill>
+                        <a:schemeClr val="tx1"/>
+                      </a:solidFill>
+                    </a:rPr>
+                    <a:t>Near Switch: tot_auto_near_switch_made_3/tot_auto_near_switch_attempts_3</a:t>
+                  </a:r>
+                </a:p>
+                <a:p>
+                  <a:r>
+                    <a:rPr lang="en-US" sz="800" b="1" dirty="0">
+                      <a:solidFill>
+                        <a:schemeClr val="tx1"/>
+                      </a:solidFill>
+                    </a:rPr>
+                    <a:t>Exchange: tot_auto_exchange_made_3/tot_auto_exchange_attempts_3</a:t>
+                  </a:r>
+                </a:p>
+                <a:p>
+                  <a:r>
+                    <a:rPr lang="en-US" sz="800" b="1" dirty="0">
+                      <a:solidFill>
+                        <a:schemeClr val="tx1"/>
+                      </a:solidFill>
+                    </a:rPr>
+                    <a:t>Pyramid Intake: tot_auto_pyramid_intake_3</a:t>
+                  </a:r>
+                </a:p>
+                <a:p>
+                  <a:r>
+                    <a:rPr lang="en-US" sz="800" b="1" dirty="0">
+                      <a:solidFill>
+                        <a:schemeClr val="tx1"/>
+                      </a:solidFill>
+                    </a:rPr>
+                    <a:t>Unprotected Intake: tot_auto_unprotected_intake_3</a:t>
+                  </a:r>
+                </a:p>
+                <a:p>
+                  <a:r>
+                    <a:rPr lang="en-US" sz="800" b="1" dirty="0">
+                      <a:solidFill>
+                        <a:schemeClr val="tx1"/>
+                      </a:solidFill>
+                    </a:rPr>
+                    <a:t>Starts LMR: tot_auto_left_3/tot_auto_center_3/tot_auto_right_3</a:t>
+                  </a:r>
                 </a:p>
               </p:txBody>
             </p:sp>
@@ -7970,46 +8236,56 @@
                 <a:lstStyle/>
                 <a:p>
                   <a:r>
-                    <a:rPr lang="en-US" sz="1200" b="1" dirty="0">
-                      <a:solidFill>
-                        <a:schemeClr val="tx1"/>
-                      </a:solidFill>
-                    </a:rPr>
-                    <a:t>High Goals: avg_tele_high_made_3/avg_tele_high_attempts_3/max_tele_high_made_3</a:t>
-                  </a:r>
-                </a:p>
-                <a:p>
-                  <a:r>
-                    <a:rPr lang="en-US" sz="1200" b="1" dirty="0">
-                      <a:solidFill>
-                        <a:schemeClr val="tx1"/>
-                      </a:solidFill>
-                    </a:rPr>
-                    <a:t>Low Goals: avg_tele_low_made_3/avg_tele_low_attempts_3/max_tele_low_made_3</a:t>
-                  </a:r>
-                </a:p>
-                <a:p>
-                  <a:r>
-                    <a:rPr lang="en-US" sz="1200" b="1" dirty="0">
-                      <a:solidFill>
-                        <a:schemeClr val="tx1"/>
-                      </a:solidFill>
-                    </a:rPr>
-                    <a:t>Gears Scored: avg_tele_gears_scored_3/avg_tele_gears_attempts_3/max_tele_gears_scored_3</a:t>
-                  </a:r>
-                </a:p>
-                <a:p>
-                  <a:r>
-                    <a:rPr lang="en-US" sz="1200" b="1" dirty="0">
-                      <a:solidFill>
-                        <a:schemeClr val="tx1"/>
-                      </a:solidFill>
-                    </a:rPr>
-                    <a:t>Gears KO: tot_tele_gear_knockouts_3</a:t>
-                  </a:r>
-                </a:p>
-                <a:p>
-                  <a:endParaRPr lang="en-US" sz="1200" b="1" dirty="0">
+                    <a:rPr lang="en-US" sz="800" b="1" dirty="0">
+                      <a:solidFill>
+                        <a:schemeClr val="tx1"/>
+                      </a:solidFill>
+                    </a:rPr>
+                    <a:t>Exchange: avg_tele_exchange_made_3/avg_tele_exchange_attempts_3</a:t>
+                  </a:r>
+                </a:p>
+                <a:p>
+                  <a:r>
+                    <a:rPr lang="en-US" sz="800" b="1" dirty="0">
+                      <a:solidFill>
+                        <a:schemeClr val="tx1"/>
+                      </a:solidFill>
+                    </a:rPr>
+                    <a:t>Near Switch: avg_tele_near_switch_made_3/avg_tele_near_switch_attempts_3</a:t>
+                  </a:r>
+                </a:p>
+                <a:p>
+                  <a:r>
+                    <a:rPr lang="en-US" sz="800" b="1" dirty="0">
+                      <a:solidFill>
+                        <a:schemeClr val="tx1"/>
+                      </a:solidFill>
+                    </a:rPr>
+                    <a:t>Far Switch: avg_tele_far_switch_made_3/avg_tele_far_switch_attempts_3</a:t>
+                  </a:r>
+                </a:p>
+                <a:p>
+                  <a:r>
+                    <a:rPr lang="en-US" sz="800" b="1" dirty="0">
+                      <a:solidFill>
+                        <a:schemeClr val="tx1"/>
+                      </a:solidFill>
+                    </a:rPr>
+                    <a:t>Scale High: avg_tele_scale_high_made_3/avg_tele_scale_high_attempts_3</a:t>
+                  </a:r>
+                </a:p>
+                <a:p>
+                  <a:r>
+                    <a:rPr lang="en-US" sz="800" b="1" dirty="0">
+                      <a:solidFill>
+                        <a:schemeClr val="tx1"/>
+                      </a:solidFill>
+                    </a:rPr>
+                    <a:t>Scale Low: avg_tele_scale_low_made_3/avg_tele_scale_low_attempts_3</a:t>
+                  </a:r>
+                </a:p>
+                <a:p>
+                  <a:endParaRPr lang="en-US" sz="800" b="1" dirty="0">
                     <a:solidFill>
                       <a:schemeClr val="tx1"/>
                     </a:solidFill>
@@ -8017,46 +8293,46 @@
                 </a:p>
                 <a:p>
                   <a:r>
-                    <a:rPr lang="en-US" sz="1200" b="1" dirty="0">
-                      <a:solidFill>
-                        <a:schemeClr val="tx1"/>
-                      </a:solidFill>
-                    </a:rPr>
-                    <a:t>Floor Ball Intake: avg_tele_floor_ball_intake_3</a:t>
-                  </a:r>
-                </a:p>
-                <a:p>
-                  <a:r>
-                    <a:rPr lang="en-US" sz="1200" b="1" dirty="0">
-                      <a:solidFill>
-                        <a:schemeClr val="tx1"/>
-                      </a:solidFill>
-                    </a:rPr>
-                    <a:t>Hopper Ball Intake: avg_tele_hopper_intake_3</a:t>
-                  </a:r>
-                </a:p>
-                <a:p>
-                  <a:r>
-                    <a:rPr lang="en-US" sz="1200" b="1" dirty="0">
-                      <a:solidFill>
-                        <a:schemeClr val="tx1"/>
-                      </a:solidFill>
-                    </a:rPr>
-                    <a:t>Floor Gear Intake: avg_tele_floor_gear_intake_3</a:t>
-                  </a:r>
-                </a:p>
-                <a:p>
-                  <a:r>
-                    <a:rPr lang="en-US" sz="1200" b="1" dirty="0">
-                      <a:solidFill>
-                        <a:schemeClr val="tx1"/>
-                      </a:solidFill>
-                    </a:rPr>
-                    <a:t>HP Gear Intake: avg_hp_gear_intake_3/avg_hp_gear_intake_miss_3</a:t>
-                  </a:r>
-                </a:p>
-                <a:p>
-                  <a:endParaRPr lang="en-US" sz="1200" b="1" dirty="0">
+                    <a:rPr lang="en-US" sz="800" b="1" dirty="0">
+                      <a:solidFill>
+                        <a:schemeClr val="tx1"/>
+                      </a:solidFill>
+                    </a:rPr>
+                    <a:t>Portal Intake: avg_tele_portal_intake_made_3/avg_tele_portal_intake_attempts_3</a:t>
+                  </a:r>
+                </a:p>
+                <a:p>
+                  <a:r>
+                    <a:rPr lang="en-US" sz="800" b="1" dirty="0">
+                      <a:solidFill>
+                        <a:schemeClr val="tx1"/>
+                      </a:solidFill>
+                    </a:rPr>
+                    <a:t>Pyramid Intake: avg_tele_pyramid_intake_3</a:t>
+                  </a:r>
+                </a:p>
+                <a:p>
+                  <a:r>
+                    <a:rPr lang="en-US" sz="800" b="1" dirty="0">
+                      <a:solidFill>
+                        <a:schemeClr val="tx1"/>
+                      </a:solidFill>
+                    </a:rPr>
+                    <a:t>Unprotected Intake: avg_tele_unprotected_intake_3</a:t>
+                  </a:r>
+                </a:p>
+                <a:p>
+                  <a:r>
+                    <a:rPr lang="en-US" sz="800" b="1" dirty="0">
+                      <a:solidFill>
+                        <a:schemeClr val="tx1"/>
+                      </a:solidFill>
+                    </a:rPr>
+                    <a:t>Floor Intake: avg_tele_floor_intake_3</a:t>
+                  </a:r>
+                </a:p>
+                <a:p>
+                  <a:endParaRPr lang="en-US" sz="800" b="1" dirty="0">
                     <a:solidFill>
                       <a:schemeClr val="tx1"/>
                     </a:solidFill>
@@ -8064,32 +8340,109 @@
                 </a:p>
                 <a:p>
                   <a:r>
-                    <a:rPr lang="en-US" sz="1200" b="1" dirty="0">
-                      <a:solidFill>
-                        <a:schemeClr val="tx1"/>
-                      </a:solidFill>
-                    </a:rPr>
-                    <a:t>Climb: tot_climb_3/tot_climb_attempts_3</a:t>
-                  </a:r>
-                </a:p>
-                <a:p>
-                  <a:r>
-                    <a:rPr lang="en-US" sz="1200" b="1" dirty="0">
+                    <a:rPr lang="en-US" sz="800" b="1" dirty="0">
+                      <a:solidFill>
+                        <a:schemeClr val="tx1"/>
+                      </a:solidFill>
+                    </a:rPr>
+                    <a:t>Knockouts: avg_tele_knockouts_3</a:t>
+                  </a:r>
+                </a:p>
+                <a:p>
+                  <a:r>
+                    <a:rPr lang="en-US" sz="800" b="1" dirty="0">
+                      <a:solidFill>
+                        <a:schemeClr val="tx1"/>
+                      </a:solidFill>
+                    </a:rPr>
+                    <a:t>Cubes Dropped: avg_tele_cubes_dropped_3</a:t>
+                  </a:r>
+                </a:p>
+                <a:p>
+                  <a:r>
+                    <a:rPr lang="en-US" sz="800" b="1" dirty="0">
+                      <a:solidFill>
+                        <a:schemeClr val="tx1"/>
+                      </a:solidFill>
+                    </a:rPr>
+                    <a:t>Orderly: tot_tele_orderly_3</a:t>
+                  </a:r>
+                </a:p>
+                <a:p>
+                  <a:r>
+                    <a:rPr lang="en-US" sz="800" b="1" dirty="0">
+                      <a:solidFill>
+                        <a:schemeClr val="tx1"/>
+                      </a:solidFill>
+                    </a:rPr>
+                    <a:t>Highest Level: max_tele_highest_level_3</a:t>
+                  </a:r>
+                </a:p>
+                <a:p>
+                  <a:endParaRPr lang="en-US" sz="800" b="1" dirty="0">
+                    <a:solidFill>
+                      <a:schemeClr val="tx1"/>
+                    </a:solidFill>
+                  </a:endParaRPr>
+                </a:p>
+                <a:p>
+                  <a:r>
+                    <a:rPr lang="en-US" sz="800" b="1" dirty="0">
+                      <a:solidFill>
+                        <a:schemeClr val="tx1"/>
+                      </a:solidFill>
+                    </a:rPr>
+                    <a:t>Climb: tot_tele_climb_3/tot_tele_climb_attempts_3</a:t>
+                  </a:r>
+                </a:p>
+                <a:p>
+                  <a:r>
+                    <a:rPr lang="en-US" sz="800" b="1" dirty="0">
+                      <a:solidFill>
+                        <a:schemeClr val="tx1"/>
+                      </a:solidFill>
+                    </a:rPr>
+                    <a:t>Assisted: tot_tele_climb_assisted_3</a:t>
+                  </a:r>
+                </a:p>
+                <a:p>
+                  <a:r>
+                    <a:rPr lang="en-US" sz="800" b="1" dirty="0">
+                      <a:solidFill>
+                        <a:schemeClr val="tx1"/>
+                      </a:solidFill>
+                    </a:rPr>
+                    <a:t>Plus One: tot_tele_plus_one_3/tot_tele_plus_one_attempts_3</a:t>
+                  </a:r>
+                </a:p>
+                <a:p>
+                  <a:r>
+                    <a:rPr lang="en-US" sz="800" b="1" dirty="0">
+                      <a:solidFill>
+                        <a:schemeClr val="tx1"/>
+                      </a:solidFill>
+                    </a:rPr>
+                    <a:t>Plus Two: tot_tele_plus_two_3/tot_tele_plus_two_attempts_3</a:t>
+                  </a:r>
+                </a:p>
+                <a:p>
+                  <a:r>
+                    <a:rPr lang="en-US" sz="800" b="1" dirty="0">
+                      <a:solidFill>
+                        <a:schemeClr val="tx1"/>
+                      </a:solidFill>
+                    </a:rPr>
+                    <a:t>Mobility: avg_mobility_rating_3</a:t>
+                  </a:r>
+                </a:p>
+                <a:p>
+                  <a:r>
+                    <a:rPr lang="en-US" sz="800" b="1" dirty="0">
                       <a:solidFill>
                         <a:schemeClr val="tx1"/>
                       </a:solidFill>
                     </a:rPr>
                     <a:t>Defense: avg_defense_rating_3</a:t>
-                  </a:r>
-                </a:p>
-                <a:p>
-                  <a:r>
-                    <a:rPr lang="en-US" sz="1200" b="1" dirty="0">
-                      <a:solidFill>
-                        <a:schemeClr val="tx1"/>
-                      </a:solidFill>
-                    </a:rPr>
-                    <a:t>Mobility: avg_mobility_rating_3</a:t>
                   </a:r>
                 </a:p>
               </p:txBody>
@@ -8143,70 +8496,83 @@
                 <a:lstStyle/>
                 <a:p>
                   <a:r>
-                    <a:rPr lang="en-US" sz="1200" b="1" dirty="0">
-                      <a:solidFill>
-                        <a:schemeClr val="tx1"/>
-                      </a:solidFill>
-                    </a:rPr>
-                    <a:t>Baseline: tot_baseline_cross_4</a:t>
-                  </a:r>
-                </a:p>
-                <a:p>
-                  <a:r>
-                    <a:rPr lang="en-US" sz="1200" b="1" dirty="0">
-                      <a:solidFill>
-                        <a:schemeClr val="tx1"/>
-                      </a:solidFill>
-                    </a:rPr>
-                    <a:t>High Goals: avg_auto_high_made_4/avg_auto_high_attempts_4/max_auto_high_made_4</a:t>
-                  </a:r>
-                </a:p>
-                <a:p>
-                  <a:r>
-                    <a:rPr lang="en-US" sz="1200" b="1" dirty="0">
-                      <a:solidFill>
-                        <a:schemeClr val="tx1"/>
-                      </a:solidFill>
-                    </a:rPr>
-                    <a:t>Low Goals: avg_auto_low_made_4/avg_auto_low_attempts_4/max_auto_low_made_4</a:t>
-                  </a:r>
-                </a:p>
-                <a:p>
-                  <a:r>
-                    <a:rPr lang="en-US" sz="1200" b="1" dirty="0">
-                      <a:solidFill>
-                        <a:schemeClr val="tx1"/>
-                      </a:solidFill>
-                    </a:rPr>
-                    <a:t>Hopper Intake: avg_auto_hopper_intake_4</a:t>
-                  </a:r>
-                </a:p>
-                <a:p>
-                  <a:r>
-                    <a:rPr lang="en-US" sz="1200" b="1" dirty="0">
-                      <a:solidFill>
-                        <a:schemeClr val="tx1"/>
-                      </a:solidFill>
-                    </a:rPr>
-                    <a:t>Gears Scored FMB: tot_auto_gears_scored_fdr_4/tot_auto_gears_scored_mid_4/tot_auto_gears_scored_boi_4</a:t>
-                  </a:r>
-                </a:p>
-                <a:p>
-                  <a:r>
-                    <a:rPr lang="en-US" sz="1200" b="1" dirty="0">
-                      <a:solidFill>
-                        <a:schemeClr val="tx1"/>
-                      </a:solidFill>
-                    </a:rPr>
-                    <a:t>Gears Scored Tot: tot_auto_gears_scored_4/tot_auto_gears_attempts_4/max_auto_gears_scored_4</a:t>
-                  </a:r>
-                </a:p>
-                <a:p>
-                  <a:endParaRPr lang="en-US" sz="1200" b="1" dirty="0">
-                    <a:solidFill>
-                      <a:schemeClr val="tx1"/>
-                    </a:solidFill>
-                  </a:endParaRPr>
+                    <a:rPr lang="en-US" sz="800" b="1" dirty="0">
+                      <a:solidFill>
+                        <a:schemeClr val="tx1"/>
+                      </a:solidFill>
+                    </a:rPr>
+                    <a:t>Cross: tot_auto_cross_4</a:t>
+                  </a:r>
+                </a:p>
+                <a:p>
+                  <a:r>
+                    <a:rPr lang="en-US" sz="800" b="1" dirty="0">
+                      <a:solidFill>
+                        <a:schemeClr val="tx1"/>
+                      </a:solidFill>
+                    </a:rPr>
+                    <a:t>High Scale: tot_auto_scale_high_made_4/tot_auto_scale_high_attempts_4</a:t>
+                  </a:r>
+                </a:p>
+                <a:p>
+                  <a:r>
+                    <a:rPr lang="en-US" sz="800" b="1" dirty="0">
+                      <a:solidFill>
+                        <a:schemeClr val="tx1"/>
+                      </a:solidFill>
+                    </a:rPr>
+                    <a:t>Low Scale: tot_auto_scale_low_made_4/tot_auto_scale_low_attempts_4</a:t>
+                  </a:r>
+                </a:p>
+                <a:p>
+                  <a:r>
+                    <a:rPr lang="en-US" sz="800" b="1" dirty="0">
+                      <a:solidFill>
+                        <a:schemeClr val="tx1"/>
+                      </a:solidFill>
+                    </a:rPr>
+                    <a:t>Near Switch: tot_auto_near_switch_made_4/tot_auto_near_switch_attempts_4</a:t>
+                  </a:r>
+                </a:p>
+                <a:p>
+                  <a:r>
+                    <a:rPr lang="en-US" sz="800" b="1" dirty="0">
+                      <a:solidFill>
+                        <a:schemeClr val="tx1"/>
+                      </a:solidFill>
+                    </a:rPr>
+                    <a:t>Exchange: tot_auto_exchange_made_4/tot_auto_exchange_attempts_4</a:t>
+                  </a:r>
+                </a:p>
+                <a:p>
+                  <a:r>
+                    <a:rPr lang="en-US" sz="800" b="1" dirty="0">
+                      <a:solidFill>
+                        <a:schemeClr val="tx1"/>
+                      </a:solidFill>
+                    </a:rPr>
+                    <a:t>Pyramid Intake: tot_auto_pyramid_intake_4</a:t>
+                  </a:r>
+                </a:p>
+                <a:p>
+                  <a:r>
+                    <a:rPr lang="en-US" sz="800" b="1" dirty="0">
+                      <a:solidFill>
+                        <a:schemeClr val="tx1"/>
+                      </a:solidFill>
+                    </a:rPr>
+                    <a:t>Unprotected Intake: tot_auto_unprotected_intake_4</a:t>
+                  </a:r>
+                </a:p>
+                <a:p>
+                  <a:r>
+                    <a:rPr lang="en-US" sz="800" b="1" dirty="0">
+                      <a:solidFill>
+                        <a:schemeClr val="tx1"/>
+                      </a:solidFill>
+                    </a:rPr>
+                    <a:t>Starts LMR: tot_auto_left_4/tot_auto_center_4/tot_auto_right_4</a:t>
+                  </a:r>
                 </a:p>
               </p:txBody>
             </p:sp>
@@ -8218,8 +8584,8 @@
               </p:nvSpPr>
               <p:spPr>
                 <a:xfrm>
-                  <a:off x="3905996" y="592194"/>
-                  <a:ext cx="1298331" cy="268883"/>
+                  <a:off x="3897379" y="592194"/>
+                  <a:ext cx="1306949" cy="268883"/>
                 </a:xfrm>
                 <a:prstGeom prst="rect">
                   <a:avLst/>
@@ -8260,7 +8626,7 @@
                 <a:p>
                   <a:pPr algn="ctr"/>
                   <a:r>
-                    <a:rPr lang="en-US" sz="1200" b="1" dirty="0">
+                    <a:rPr lang="en-US" sz="800" b="1" dirty="0">
                       <a:solidFill>
                         <a:schemeClr val="tx1"/>
                       </a:solidFill>
@@ -8278,8 +8644,8 @@
               </p:nvSpPr>
               <p:spPr>
                 <a:xfrm>
-                  <a:off x="3905997" y="867008"/>
-                  <a:ext cx="1285140" cy="268883"/>
+                  <a:off x="3899399" y="867008"/>
+                  <a:ext cx="1291739" cy="268883"/>
                 </a:xfrm>
                 <a:prstGeom prst="rect">
                   <a:avLst/>
@@ -8320,180 +8686,23 @@
                 <a:p>
                   <a:pPr algn="ctr"/>
                   <a:r>
-                    <a:rPr lang="en-US" sz="1200" b="1" dirty="0">
-                      <a:solidFill>
-                        <a:schemeClr val="tx1"/>
-                      </a:solidFill>
-                    </a:rPr>
-                    <a:t>Avg. </a:t>
-                  </a:r>
-                  <a:r>
-                    <a:rPr lang="en-US" sz="1200" b="1" dirty="0" err="1">
-                      <a:solidFill>
-                        <a:schemeClr val="tx1"/>
-                      </a:solidFill>
-                    </a:rPr>
-                    <a:t>kPa</a:t>
-                  </a:r>
-                  <a:r>
-                    <a:rPr lang="en-US" sz="1200" b="1" dirty="0">
-                      <a:solidFill>
-                        <a:schemeClr val="tx1"/>
-                      </a:solidFill>
-                    </a:rPr>
-                    <a:t>: avg_auto_contrib_kpa_4/avg_contrib_kpa_4/max_contrib_kpa_4</a:t>
-                  </a:r>
-                </a:p>
-              </p:txBody>
-            </p:sp>
-            <p:sp>
-              <p:nvSpPr>
-                <p:cNvPr id="67" name="Rectangle 66"/>
-                <p:cNvSpPr/>
-                <p:nvPr/>
-              </p:nvSpPr>
-              <p:spPr>
-                <a:xfrm>
-                  <a:off x="5184539" y="867008"/>
-                  <a:ext cx="1300532" cy="268883"/>
-                </a:xfrm>
-                <a:prstGeom prst="rect">
-                  <a:avLst/>
-                </a:prstGeom>
-                <a:solidFill>
-                  <a:schemeClr val="bg1"/>
-                </a:solidFill>
-                <a:ln w="38100">
-                  <a:solidFill>
-                    <a:schemeClr val="tx1"/>
-                  </a:solidFill>
-                </a:ln>
-              </p:spPr>
-              <p:style>
-                <a:lnRef idx="2">
-                  <a:schemeClr val="accent1">
-                    <a:shade val="50000"/>
-                  </a:schemeClr>
-                </a:lnRef>
-                <a:fillRef idx="1">
-                  <a:schemeClr val="accent1"/>
-                </a:fillRef>
-                <a:effectRef idx="0">
-                  <a:schemeClr val="accent1"/>
-                </a:effectRef>
-                <a:fontRef idx="minor">
-                  <a:schemeClr val="lt1"/>
-                </a:fontRef>
-              </p:style>
-              <p:txBody>
-                <a:bodyPr rot="0" spcFirstLastPara="0" vertOverflow="overflow" horzOverflow="overflow" vert="horz" wrap="square" lIns="91440" tIns="45720" rIns="91440" bIns="45720" numCol="1" spcCol="0" rtlCol="0" fromWordArt="0" anchor="ctr" anchorCtr="0" forceAA="0" compatLnSpc="1">
-                  <a:prstTxWarp prst="textNoShape">
-                    <a:avLst/>
-                  </a:prstTxWarp>
-                  <a:noAutofit/>
-                </a:bodyPr>
-                <a:lstStyle/>
+                    <a:rPr lang="en-US" sz="800" b="1" dirty="0">
+                      <a:solidFill>
+                        <a:schemeClr val="tx1"/>
+                      </a:solidFill>
+                    </a:rPr>
+                    <a:t>Avg. Intake: avg_tele_intake_4/max_tele_intake_4</a:t>
+                  </a:r>
+                </a:p>
                 <a:p>
                   <a:pPr algn="ctr"/>
                   <a:r>
-                    <a:rPr lang="en-US" sz="1200" b="1" dirty="0">
-                      <a:solidFill>
-                        <a:schemeClr val="tx1"/>
-                      </a:solidFill>
-                    </a:rPr>
-                    <a:t>Avg. </a:t>
-                  </a:r>
-                  <a:r>
-                    <a:rPr lang="en-US" sz="1200" b="1" dirty="0" err="1">
-                      <a:solidFill>
-                        <a:schemeClr val="tx1"/>
-                      </a:solidFill>
-                    </a:rPr>
-                    <a:t>kPa</a:t>
-                  </a:r>
-                  <a:r>
-                    <a:rPr lang="en-US" sz="1200" b="1" dirty="0">
-                      <a:solidFill>
-                        <a:schemeClr val="tx1"/>
-                      </a:solidFill>
-                    </a:rPr>
-                    <a:t>: avg_auto_contrib_kpa_5/avg_contrib_kpa_5/max_contrib_kpa_5</a:t>
-                  </a:r>
-                </a:p>
-              </p:txBody>
-            </p:sp>
-            <p:sp>
-              <p:nvSpPr>
-                <p:cNvPr id="68" name="Rectangle 67"/>
-                <p:cNvSpPr/>
-                <p:nvPr/>
-              </p:nvSpPr>
-              <p:spPr>
-                <a:xfrm>
-                  <a:off x="6485069" y="867008"/>
-                  <a:ext cx="1293932" cy="268883"/>
-                </a:xfrm>
-                <a:prstGeom prst="rect">
-                  <a:avLst/>
-                </a:prstGeom>
-                <a:solidFill>
-                  <a:schemeClr val="bg1"/>
-                </a:solidFill>
-                <a:ln w="38100">
-                  <a:solidFill>
-                    <a:schemeClr val="tx1"/>
-                  </a:solidFill>
-                </a:ln>
-              </p:spPr>
-              <p:style>
-                <a:lnRef idx="2">
-                  <a:schemeClr val="accent1">
-                    <a:shade val="50000"/>
-                  </a:schemeClr>
-                </a:lnRef>
-                <a:fillRef idx="1">
-                  <a:schemeClr val="accent1"/>
-                </a:fillRef>
-                <a:effectRef idx="0">
-                  <a:schemeClr val="accent1"/>
-                </a:effectRef>
-                <a:fontRef idx="minor">
-                  <a:schemeClr val="lt1"/>
-                </a:fontRef>
-              </p:style>
-              <p:txBody>
-                <a:bodyPr rot="0" spcFirstLastPara="0" vertOverflow="overflow" horzOverflow="overflow" vert="horz" wrap="square" lIns="91440" tIns="45720" rIns="91440" bIns="45720" numCol="1" spcCol="0" rtlCol="0" fromWordArt="0" anchor="ctr" anchorCtr="0" forceAA="0" compatLnSpc="1">
-                  <a:prstTxWarp prst="textNoShape">
-                    <a:avLst/>
-                  </a:prstTxWarp>
-                  <a:noAutofit/>
-                </a:bodyPr>
-                <a:lstStyle/>
-                <a:p>
-                  <a:pPr algn="ctr"/>
-                  <a:r>
-                    <a:rPr lang="en-US" sz="1200" b="1" dirty="0">
-                      <a:solidFill>
-                        <a:schemeClr val="tx1"/>
-                      </a:solidFill>
-                    </a:rPr>
-                    <a:t>Avg. </a:t>
-                  </a:r>
-                  <a:r>
-                    <a:rPr lang="en-US" sz="1200" b="1" dirty="0" err="1">
-                      <a:solidFill>
-                        <a:schemeClr val="tx1"/>
-                      </a:solidFill>
-                    </a:rPr>
-                    <a:t>kPa</a:t>
-                  </a:r>
-                  <a:r>
-                    <a:rPr lang="en-US" sz="1200" b="1" dirty="0">
-                      <a:solidFill>
-                        <a:schemeClr val="tx1"/>
-                      </a:solidFill>
-                    </a:rPr>
-                    <a:t>: avg_auto_contrib_kpa_6/avg_contrib_kpa_6/max_contrib_kpa_6</a:t>
+                    <a:rPr lang="en-US" sz="800" b="1" dirty="0">
+                      <a:solidFill>
+                        <a:schemeClr val="tx1"/>
+                      </a:solidFill>
+                    </a:rPr>
+                    <a:t>Avg. Intake: avg_tele_cubes_scored_4/max_tele_cubes_scored_4</a:t>
                   </a:r>
                 </a:p>
               </p:txBody>
@@ -8552,12 +8761,12 @@
                     </a:spcBef>
                   </a:pPr>
                   <a:r>
-                    <a:rPr lang="en-US" sz="1200" b="1" dirty="0">
-                      <a:solidFill>
-                        <a:schemeClr val="tx1"/>
-                      </a:solidFill>
-                    </a:rPr>
-                    <a:t>High Goals: avg_tele_high_made_4/avg_tele_high_attempts_4/max_tele_high_made_4</a:t>
+                    <a:rPr lang="en-US" sz="800" b="1" dirty="0">
+                      <a:solidFill>
+                        <a:schemeClr val="tx1"/>
+                      </a:solidFill>
+                    </a:rPr>
+                    <a:t>Exchange: avg_tele_exchange_made_4/avg_tele_exchange_attempts_4</a:t>
                   </a:r>
                 </a:p>
                 <a:p>
@@ -8567,12 +8776,12 @@
                     </a:spcBef>
                   </a:pPr>
                   <a:r>
-                    <a:rPr lang="en-US" sz="1200" b="1" dirty="0">
-                      <a:solidFill>
-                        <a:schemeClr val="tx1"/>
-                      </a:solidFill>
-                    </a:rPr>
-                    <a:t>Low Goals: avg_tele_low_made_4/avg_tele_low_attempts_4/max_tele_low_made_4</a:t>
+                    <a:rPr lang="en-US" sz="800" b="1" dirty="0">
+                      <a:solidFill>
+                        <a:schemeClr val="tx1"/>
+                      </a:solidFill>
+                    </a:rPr>
+                    <a:t>Near Switch: avg_tele_near_switch_made_4/avg_tele_near_switch_attempts_4</a:t>
                   </a:r>
                 </a:p>
                 <a:p>
@@ -8582,12 +8791,12 @@
                     </a:spcBef>
                   </a:pPr>
                   <a:r>
-                    <a:rPr lang="en-US" sz="1200" b="1" dirty="0">
-                      <a:solidFill>
-                        <a:schemeClr val="tx1"/>
-                      </a:solidFill>
-                    </a:rPr>
-                    <a:t>Gears Scored: avg_tele_gears_scored_4/avg_tele_gears_attempts_4/max_tele_gears_scored_4</a:t>
+                    <a:rPr lang="en-US" sz="800" b="1" dirty="0">
+                      <a:solidFill>
+                        <a:schemeClr val="tx1"/>
+                      </a:solidFill>
+                    </a:rPr>
+                    <a:t>Far Switch: avg_tele_far_switch_made_4/avg_tele_far_switch_attempts_4</a:t>
                   </a:r>
                 </a:p>
                 <a:p>
@@ -8597,12 +8806,12 @@
                     </a:spcBef>
                   </a:pPr>
                   <a:r>
-                    <a:rPr lang="en-US" sz="1200" b="1" dirty="0">
-                      <a:solidFill>
-                        <a:schemeClr val="tx1"/>
-                      </a:solidFill>
-                    </a:rPr>
-                    <a:t>Gears KO: tot_tele_gear_knockouts_4</a:t>
+                    <a:rPr lang="en-US" sz="800" b="1" dirty="0">
+                      <a:solidFill>
+                        <a:schemeClr val="tx1"/>
+                      </a:solidFill>
+                    </a:rPr>
+                    <a:t>Scale High: avg_tele_scale_high_made_4/avg_tele_scale_high_attempts_4</a:t>
                   </a:r>
                 </a:p>
                 <a:p>
@@ -8611,11 +8820,14 @@
                       <a:spcPts val="10"/>
                     </a:spcBef>
                   </a:pPr>
-                  <a:endParaRPr lang="en-US" sz="1200" b="1" dirty="0">
-                    <a:solidFill>
-                      <a:schemeClr val="tx1"/>
-                    </a:solidFill>
-                  </a:endParaRPr>
+                  <a:r>
+                    <a:rPr lang="en-US" sz="800" b="1" dirty="0">
+                      <a:solidFill>
+                        <a:schemeClr val="tx1"/>
+                      </a:solidFill>
+                    </a:rPr>
+                    <a:t>Scale Low: avg_tele_scale_low_made_4/avg_tele_scale_low_attempts_4</a:t>
+                  </a:r>
                 </a:p>
                 <a:p>
                   <a:pPr>
@@ -8623,14 +8835,11 @@
                       <a:spcPts val="10"/>
                     </a:spcBef>
                   </a:pPr>
-                  <a:r>
-                    <a:rPr lang="en-US" sz="1200" b="1" dirty="0">
-                      <a:solidFill>
-                        <a:schemeClr val="tx1"/>
-                      </a:solidFill>
-                    </a:rPr>
-                    <a:t>Floor Ball Intake: avg_tele_floor_ball_intake_4</a:t>
-                  </a:r>
+                  <a:endParaRPr lang="en-US" sz="800" b="1" dirty="0">
+                    <a:solidFill>
+                      <a:schemeClr val="tx1"/>
+                    </a:solidFill>
+                  </a:endParaRPr>
                 </a:p>
                 <a:p>
                   <a:pPr>
@@ -8639,12 +8848,12 @@
                     </a:spcBef>
                   </a:pPr>
                   <a:r>
-                    <a:rPr lang="en-US" sz="1200" b="1" dirty="0">
-                      <a:solidFill>
-                        <a:schemeClr val="tx1"/>
-                      </a:solidFill>
-                    </a:rPr>
-                    <a:t>Hopper Ball Intake: avg_tele_hopper_intake_4</a:t>
+                    <a:rPr lang="en-US" sz="800" b="1" dirty="0">
+                      <a:solidFill>
+                        <a:schemeClr val="tx1"/>
+                      </a:solidFill>
+                    </a:rPr>
+                    <a:t>Portal Intake: avg_tele_portal_intake_made_4/avg_tele_portal_intake_attempts_4</a:t>
                   </a:r>
                 </a:p>
                 <a:p>
@@ -8654,12 +8863,12 @@
                     </a:spcBef>
                   </a:pPr>
                   <a:r>
-                    <a:rPr lang="en-US" sz="1200" b="1" dirty="0">
-                      <a:solidFill>
-                        <a:schemeClr val="tx1"/>
-                      </a:solidFill>
-                    </a:rPr>
-                    <a:t>Floor Gear Intake: avg_tele_floor_gear_intake_4</a:t>
+                    <a:rPr lang="en-US" sz="800" b="1" dirty="0">
+                      <a:solidFill>
+                        <a:schemeClr val="tx1"/>
+                      </a:solidFill>
+                    </a:rPr>
+                    <a:t>Pyramid Intake: avg_tele_pyramid_intake_4</a:t>
                   </a:r>
                 </a:p>
                 <a:p>
@@ -8669,12 +8878,12 @@
                     </a:spcBef>
                   </a:pPr>
                   <a:r>
-                    <a:rPr lang="en-US" sz="1200" b="1" dirty="0">
-                      <a:solidFill>
-                        <a:schemeClr val="tx1"/>
-                      </a:solidFill>
-                    </a:rPr>
-                    <a:t>HP Gear Intake: avg_hp_gear_intake_4/avg_hp_gear_intake_miss_4</a:t>
+                    <a:rPr lang="en-US" sz="800" b="1" dirty="0">
+                      <a:solidFill>
+                        <a:schemeClr val="tx1"/>
+                      </a:solidFill>
+                    </a:rPr>
+                    <a:t>Unprotected Intake: avg_tele_unprotected_intake_4</a:t>
                   </a:r>
                 </a:p>
                 <a:p>
@@ -8683,11 +8892,14 @@
                       <a:spcPts val="10"/>
                     </a:spcBef>
                   </a:pPr>
-                  <a:endParaRPr lang="en-US" sz="1200" b="1" dirty="0">
-                    <a:solidFill>
-                      <a:schemeClr val="tx1"/>
-                    </a:solidFill>
-                  </a:endParaRPr>
+                  <a:r>
+                    <a:rPr lang="en-US" sz="800" b="1" dirty="0">
+                      <a:solidFill>
+                        <a:schemeClr val="tx1"/>
+                      </a:solidFill>
+                    </a:rPr>
+                    <a:t>Floor Intake: avg_tele_floor_intake_4</a:t>
+                  </a:r>
                 </a:p>
                 <a:p>
                   <a:pPr>
@@ -8695,14 +8907,11 @@
                       <a:spcPts val="10"/>
                     </a:spcBef>
                   </a:pPr>
-                  <a:r>
-                    <a:rPr lang="en-US" sz="1200" b="1" dirty="0">
-                      <a:solidFill>
-                        <a:schemeClr val="tx1"/>
-                      </a:solidFill>
-                    </a:rPr>
-                    <a:t>Climb: tot_climb_4/tot_climb_attempts_4</a:t>
-                  </a:r>
+                  <a:endParaRPr lang="en-US" sz="800" b="1" dirty="0">
+                    <a:solidFill>
+                      <a:schemeClr val="tx1"/>
+                    </a:solidFill>
+                  </a:endParaRPr>
                 </a:p>
                 <a:p>
                   <a:pPr>
@@ -8711,12 +8920,12 @@
                     </a:spcBef>
                   </a:pPr>
                   <a:r>
-                    <a:rPr lang="en-US" sz="1200" b="1" dirty="0">
-                      <a:solidFill>
-                        <a:schemeClr val="tx1"/>
-                      </a:solidFill>
-                    </a:rPr>
-                    <a:t>Defense: avg_defense_rating_4</a:t>
+                    <a:rPr lang="en-US" sz="800" b="1" dirty="0">
+                      <a:solidFill>
+                        <a:schemeClr val="tx1"/>
+                      </a:solidFill>
+                    </a:rPr>
+                    <a:t>Knockouts: avg_tele_knockouts_4</a:t>
                   </a:r>
                 </a:p>
                 <a:p>
@@ -8726,12 +8935,144 @@
                     </a:spcBef>
                   </a:pPr>
                   <a:r>
-                    <a:rPr lang="en-US" sz="1200" b="1" dirty="0">
+                    <a:rPr lang="en-US" sz="800" b="1" dirty="0">
+                      <a:solidFill>
+                        <a:schemeClr val="tx1"/>
+                      </a:solidFill>
+                    </a:rPr>
+                    <a:t>Cubes Dropped: avg_tele_cubes_dropped_4</a:t>
+                  </a:r>
+                </a:p>
+                <a:p>
+                  <a:pPr>
+                    <a:spcBef>
+                      <a:spcPts val="10"/>
+                    </a:spcBef>
+                  </a:pPr>
+                  <a:r>
+                    <a:rPr lang="en-US" sz="800" b="1" dirty="0">
+                      <a:solidFill>
+                        <a:schemeClr val="tx1"/>
+                      </a:solidFill>
+                    </a:rPr>
+                    <a:t>Orderly: tot_tele_orderly_4</a:t>
+                  </a:r>
+                </a:p>
+                <a:p>
+                  <a:pPr>
+                    <a:spcBef>
+                      <a:spcPts val="10"/>
+                    </a:spcBef>
+                  </a:pPr>
+                  <a:r>
+                    <a:rPr lang="en-US" sz="800" b="1" dirty="0">
+                      <a:solidFill>
+                        <a:schemeClr val="tx1"/>
+                      </a:solidFill>
+                    </a:rPr>
+                    <a:t>Highest Level: max_tele_highest_level_4</a:t>
+                  </a:r>
+                </a:p>
+                <a:p>
+                  <a:pPr>
+                    <a:spcBef>
+                      <a:spcPts val="10"/>
+                    </a:spcBef>
+                  </a:pPr>
+                  <a:endParaRPr lang="en-US" sz="800" b="1" dirty="0">
+                    <a:solidFill>
+                      <a:schemeClr val="tx1"/>
+                    </a:solidFill>
+                  </a:endParaRPr>
+                </a:p>
+                <a:p>
+                  <a:pPr>
+                    <a:spcBef>
+                      <a:spcPts val="10"/>
+                    </a:spcBef>
+                  </a:pPr>
+                  <a:r>
+                    <a:rPr lang="en-US" sz="800" b="1" dirty="0">
+                      <a:solidFill>
+                        <a:schemeClr val="tx1"/>
+                      </a:solidFill>
+                    </a:rPr>
+                    <a:t>Climb: tot_tele_climb_4/tot_tele_climb_attempts_4</a:t>
+                  </a:r>
+                </a:p>
+                <a:p>
+                  <a:pPr>
+                    <a:spcBef>
+                      <a:spcPts val="10"/>
+                    </a:spcBef>
+                  </a:pPr>
+                  <a:r>
+                    <a:rPr lang="en-US" sz="800" b="1" dirty="0">
+                      <a:solidFill>
+                        <a:schemeClr val="tx1"/>
+                      </a:solidFill>
+                    </a:rPr>
+                    <a:t>Assisted: tot_tele_climb_assisted_4</a:t>
+                  </a:r>
+                </a:p>
+                <a:p>
+                  <a:pPr>
+                    <a:spcBef>
+                      <a:spcPts val="10"/>
+                    </a:spcBef>
+                  </a:pPr>
+                  <a:r>
+                    <a:rPr lang="en-US" sz="800" b="1" dirty="0">
+                      <a:solidFill>
+                        <a:schemeClr val="tx1"/>
+                      </a:solidFill>
+                    </a:rPr>
+                    <a:t>Plus One: tot_tele_plus_one_4/tot_tele_plus_one_attempts_4</a:t>
+                  </a:r>
+                </a:p>
+                <a:p>
+                  <a:pPr>
+                    <a:spcBef>
+                      <a:spcPts val="10"/>
+                    </a:spcBef>
+                  </a:pPr>
+                  <a:r>
+                    <a:rPr lang="en-US" sz="800" b="1" dirty="0">
+                      <a:solidFill>
+                        <a:schemeClr val="tx1"/>
+                      </a:solidFill>
+                    </a:rPr>
+                    <a:t>Plus Two: tot_tele_plus_two_4/tot_tele_plus_two_attempts_4</a:t>
+                  </a:r>
+                </a:p>
+                <a:p>
+                  <a:pPr>
+                    <a:spcBef>
+                      <a:spcPts val="10"/>
+                    </a:spcBef>
+                  </a:pPr>
+                  <a:r>
+                    <a:rPr lang="en-US" sz="800" b="1" dirty="0">
                       <a:solidFill>
                         <a:schemeClr val="tx1"/>
                       </a:solidFill>
                     </a:rPr>
                     <a:t>Mobility: avg_mobility_rating_4</a:t>
+                  </a:r>
+                </a:p>
+                <a:p>
+                  <a:pPr>
+                    <a:spcBef>
+                      <a:spcPts val="10"/>
+                    </a:spcBef>
+                  </a:pPr>
+                  <a:r>
+                    <a:rPr lang="en-US" sz="800" b="1" dirty="0">
+                      <a:solidFill>
+                        <a:schemeClr val="tx1"/>
+                      </a:solidFill>
+                    </a:rPr>
+                    <a:t>Defense: avg_defense_rating_4</a:t>
                   </a:r>
                 </a:p>
               </p:txBody>
@@ -8745,7 +9086,7 @@
               <p:spPr>
                 <a:xfrm>
                   <a:off x="5186738" y="590488"/>
-                  <a:ext cx="1298331" cy="268883"/>
+                  <a:ext cx="1257131" cy="268883"/>
                 </a:xfrm>
                 <a:prstGeom prst="rect">
                   <a:avLst/>
@@ -8786,7 +9127,7 @@
                 <a:p>
                   <a:pPr algn="ctr"/>
                   <a:r>
-                    <a:rPr lang="en-US" sz="1200" b="1" dirty="0">
+                    <a:rPr lang="en-US" sz="800" b="1" dirty="0">
                       <a:solidFill>
                         <a:schemeClr val="tx1"/>
                       </a:solidFill>
@@ -8804,8 +9145,8 @@
               </p:nvSpPr>
               <p:spPr>
                 <a:xfrm>
-                  <a:off x="6485067" y="590488"/>
-                  <a:ext cx="1293931" cy="268883"/>
+                  <a:off x="6449544" y="590488"/>
+                  <a:ext cx="1329454" cy="268883"/>
                 </a:xfrm>
                 <a:prstGeom prst="rect">
                   <a:avLst/>
@@ -8846,7 +9187,7 @@
                 <a:p>
                   <a:pPr algn="ctr"/>
                   <a:r>
-                    <a:rPr lang="en-US" sz="1200" b="1" dirty="0">
+                    <a:rPr lang="en-US" sz="800" b="1" dirty="0">
                       <a:solidFill>
                         <a:schemeClr val="tx1"/>
                       </a:solidFill>
@@ -8967,70 +9308,83 @@
                 <a:lstStyle/>
                 <a:p>
                   <a:r>
-                    <a:rPr lang="en-US" sz="1200" b="1" dirty="0">
-                      <a:solidFill>
-                        <a:schemeClr val="tx1"/>
-                      </a:solidFill>
-                    </a:rPr>
-                    <a:t>Baseline: tot_baseline_cross_5</a:t>
-                  </a:r>
-                </a:p>
-                <a:p>
-                  <a:r>
-                    <a:rPr lang="en-US" sz="1200" b="1" dirty="0">
-                      <a:solidFill>
-                        <a:schemeClr val="tx1"/>
-                      </a:solidFill>
-                    </a:rPr>
-                    <a:t>High Goals: avg_auto_high_made_5/avg_auto_high_attempts_5/max_auto_high_made_5</a:t>
-                  </a:r>
-                </a:p>
-                <a:p>
-                  <a:r>
-                    <a:rPr lang="en-US" sz="1200" b="1" dirty="0">
-                      <a:solidFill>
-                        <a:schemeClr val="tx1"/>
-                      </a:solidFill>
-                    </a:rPr>
-                    <a:t>Low Goals: avg_auto_low_made_5/avg_auto_low_attempts_5/max_auto_low_made_5</a:t>
-                  </a:r>
-                </a:p>
-                <a:p>
-                  <a:r>
-                    <a:rPr lang="en-US" sz="1200" b="1" dirty="0">
-                      <a:solidFill>
-                        <a:schemeClr val="tx1"/>
-                      </a:solidFill>
-                    </a:rPr>
-                    <a:t>Hopper Intake: avg_auto_hopper_intake_5</a:t>
-                  </a:r>
-                </a:p>
-                <a:p>
-                  <a:r>
-                    <a:rPr lang="en-US" sz="1200" b="1" dirty="0">
-                      <a:solidFill>
-                        <a:schemeClr val="tx1"/>
-                      </a:solidFill>
-                    </a:rPr>
-                    <a:t>Gears Scored FMB: tot_auto_gears_scored_fdr_5/tot_auto_gears_scored_mid_5/tot_auto_gears_scored_boi_5</a:t>
-                  </a:r>
-                </a:p>
-                <a:p>
-                  <a:r>
-                    <a:rPr lang="en-US" sz="1200" b="1" dirty="0">
-                      <a:solidFill>
-                        <a:schemeClr val="tx1"/>
-                      </a:solidFill>
-                    </a:rPr>
-                    <a:t>Gears Scored Tot: tot_auto_gears_scored_5/tot_auto_gears_attempts_5/max_auto_gears_scored_5</a:t>
-                  </a:r>
-                </a:p>
-                <a:p>
-                  <a:endParaRPr lang="en-US" sz="1200" b="1" dirty="0">
-                    <a:solidFill>
-                      <a:schemeClr val="tx1"/>
-                    </a:solidFill>
-                  </a:endParaRPr>
+                    <a:rPr lang="en-US" sz="800" b="1" dirty="0">
+                      <a:solidFill>
+                        <a:schemeClr val="tx1"/>
+                      </a:solidFill>
+                    </a:rPr>
+                    <a:t>Cross: tot_auto_cross_5</a:t>
+                  </a:r>
+                </a:p>
+                <a:p>
+                  <a:r>
+                    <a:rPr lang="en-US" sz="800" b="1" dirty="0">
+                      <a:solidFill>
+                        <a:schemeClr val="tx1"/>
+                      </a:solidFill>
+                    </a:rPr>
+                    <a:t>High Scale: tot_auto_scale_high_made_5/tot_auto_scale_high_attempts_5</a:t>
+                  </a:r>
+                </a:p>
+                <a:p>
+                  <a:r>
+                    <a:rPr lang="en-US" sz="800" b="1" dirty="0">
+                      <a:solidFill>
+                        <a:schemeClr val="tx1"/>
+                      </a:solidFill>
+                    </a:rPr>
+                    <a:t>Low Scale: tot_auto_scale_low_made_5/tot_auto_scale_low_attempts_5</a:t>
+                  </a:r>
+                </a:p>
+                <a:p>
+                  <a:r>
+                    <a:rPr lang="en-US" sz="800" b="1" dirty="0">
+                      <a:solidFill>
+                        <a:schemeClr val="tx1"/>
+                      </a:solidFill>
+                    </a:rPr>
+                    <a:t>Near Switch: tot_auto_near_switch_made_5/tot_auto_near_switch_attempts_5</a:t>
+                  </a:r>
+                </a:p>
+                <a:p>
+                  <a:r>
+                    <a:rPr lang="en-US" sz="800" b="1" dirty="0">
+                      <a:solidFill>
+                        <a:schemeClr val="tx1"/>
+                      </a:solidFill>
+                    </a:rPr>
+                    <a:t>Exchange: tot_auto_exchange_made_5/tot_auto_exchange_attempts_5</a:t>
+                  </a:r>
+                </a:p>
+                <a:p>
+                  <a:r>
+                    <a:rPr lang="en-US" sz="800" b="1" dirty="0">
+                      <a:solidFill>
+                        <a:schemeClr val="tx1"/>
+                      </a:solidFill>
+                    </a:rPr>
+                    <a:t>Pyramid Intake: tot_auto_pyramid_intake_5</a:t>
+                  </a:r>
+                </a:p>
+                <a:p>
+                  <a:r>
+                    <a:rPr lang="en-US" sz="800" b="1" dirty="0">
+                      <a:solidFill>
+                        <a:schemeClr val="tx1"/>
+                      </a:solidFill>
+                    </a:rPr>
+                    <a:t>Unprotected Intake: tot_auto_unprotected_intake_5</a:t>
+                  </a:r>
+                </a:p>
+                <a:p>
+                  <a:r>
+                    <a:rPr lang="en-US" sz="800" b="1" dirty="0">
+                      <a:solidFill>
+                        <a:schemeClr val="tx1"/>
+                      </a:solidFill>
+                    </a:rPr>
+                    <a:t>Starts LMR: tot_auto_left_5/tot_auto_center_5/tot_auto_right_5</a:t>
+                  </a:r>
                 </a:p>
               </p:txBody>
             </p:sp>
@@ -9083,46 +9437,56 @@
                 <a:lstStyle/>
                 <a:p>
                   <a:r>
-                    <a:rPr lang="en-US" sz="1200" b="1" dirty="0">
-                      <a:solidFill>
-                        <a:schemeClr val="tx1"/>
-                      </a:solidFill>
-                    </a:rPr>
-                    <a:t>High Goals: avg_tele_high_made_5/avg_tele_high_attempts_5/max_tele_high_made_5</a:t>
-                  </a:r>
-                </a:p>
-                <a:p>
-                  <a:r>
-                    <a:rPr lang="en-US" sz="1200" b="1" dirty="0">
-                      <a:solidFill>
-                        <a:schemeClr val="tx1"/>
-                      </a:solidFill>
-                    </a:rPr>
-                    <a:t>Low Goals: avg_tele_low_made_5/avg_tele_low_attempts_5/max_tele_low_made_5</a:t>
-                  </a:r>
-                </a:p>
-                <a:p>
-                  <a:r>
-                    <a:rPr lang="en-US" sz="1200" b="1" dirty="0">
-                      <a:solidFill>
-                        <a:schemeClr val="tx1"/>
-                      </a:solidFill>
-                    </a:rPr>
-                    <a:t>Gears Scored: avg_tele_gears_scored_5/avg_tele_gears_attempts_5/max_tele_gears_scored_5</a:t>
-                  </a:r>
-                </a:p>
-                <a:p>
-                  <a:r>
-                    <a:rPr lang="en-US" sz="1200" b="1" dirty="0">
-                      <a:solidFill>
-                        <a:schemeClr val="tx1"/>
-                      </a:solidFill>
-                    </a:rPr>
-                    <a:t>Gears KO: tot_tele_gear_knockouts_5</a:t>
-                  </a:r>
-                </a:p>
-                <a:p>
-                  <a:endParaRPr lang="en-US" sz="1200" b="1" dirty="0">
+                    <a:rPr lang="en-US" sz="800" b="1" dirty="0">
+                      <a:solidFill>
+                        <a:schemeClr val="tx1"/>
+                      </a:solidFill>
+                    </a:rPr>
+                    <a:t>Exchange: avg_tele_exchange_made_5/avg_tele_exchange_attempts_5</a:t>
+                  </a:r>
+                </a:p>
+                <a:p>
+                  <a:r>
+                    <a:rPr lang="en-US" sz="800" b="1" dirty="0">
+                      <a:solidFill>
+                        <a:schemeClr val="tx1"/>
+                      </a:solidFill>
+                    </a:rPr>
+                    <a:t>Near Switch: avg_tele_near_switch_made_5/avg_tele_near_switch_attempts_5</a:t>
+                  </a:r>
+                </a:p>
+                <a:p>
+                  <a:r>
+                    <a:rPr lang="en-US" sz="800" b="1" dirty="0">
+                      <a:solidFill>
+                        <a:schemeClr val="tx1"/>
+                      </a:solidFill>
+                    </a:rPr>
+                    <a:t>Far Switch: avg_tele_far_switch_made_5/avg_tele_far_switch_attempts_5</a:t>
+                  </a:r>
+                </a:p>
+                <a:p>
+                  <a:r>
+                    <a:rPr lang="en-US" sz="800" b="1" dirty="0">
+                      <a:solidFill>
+                        <a:schemeClr val="tx1"/>
+                      </a:solidFill>
+                    </a:rPr>
+                    <a:t>Scale High: avg_tele_scale_high_made_5/avg_tele_scale_high_attempts_5</a:t>
+                  </a:r>
+                </a:p>
+                <a:p>
+                  <a:r>
+                    <a:rPr lang="en-US" sz="800" b="1" dirty="0">
+                      <a:solidFill>
+                        <a:schemeClr val="tx1"/>
+                      </a:solidFill>
+                    </a:rPr>
+                    <a:t>Scale Low: avg_tele_scale_low_made_5/avg_tele_scale_low_attempts_5</a:t>
+                  </a:r>
+                </a:p>
+                <a:p>
+                  <a:endParaRPr lang="en-US" sz="800" b="1" dirty="0">
                     <a:solidFill>
                       <a:schemeClr val="tx1"/>
                     </a:solidFill>
@@ -9130,46 +9494,46 @@
                 </a:p>
                 <a:p>
                   <a:r>
-                    <a:rPr lang="en-US" sz="1200" b="1" dirty="0">
-                      <a:solidFill>
-                        <a:schemeClr val="tx1"/>
-                      </a:solidFill>
-                    </a:rPr>
-                    <a:t>Floor Ball Intake: avg_tele_floor_ball_intake_5</a:t>
-                  </a:r>
-                </a:p>
-                <a:p>
-                  <a:r>
-                    <a:rPr lang="en-US" sz="1200" b="1" dirty="0">
-                      <a:solidFill>
-                        <a:schemeClr val="tx1"/>
-                      </a:solidFill>
-                    </a:rPr>
-                    <a:t>Hopper Ball Intake: avg_tele_hopper_intake_5</a:t>
-                  </a:r>
-                </a:p>
-                <a:p>
-                  <a:r>
-                    <a:rPr lang="en-US" sz="1200" b="1" dirty="0">
-                      <a:solidFill>
-                        <a:schemeClr val="tx1"/>
-                      </a:solidFill>
-                    </a:rPr>
-                    <a:t>Floor Gear Intake: avg_tele_floor_gear_intake_5</a:t>
-                  </a:r>
-                </a:p>
-                <a:p>
-                  <a:r>
-                    <a:rPr lang="en-US" sz="1200" b="1" dirty="0">
-                      <a:solidFill>
-                        <a:schemeClr val="tx1"/>
-                      </a:solidFill>
-                    </a:rPr>
-                    <a:t>HP Gear Intake: avg_hp_gear_intake_5/avg_hp_gear_intake_miss_5</a:t>
-                  </a:r>
-                </a:p>
-                <a:p>
-                  <a:endParaRPr lang="en-US" sz="1200" b="1" dirty="0">
+                    <a:rPr lang="en-US" sz="800" b="1" dirty="0">
+                      <a:solidFill>
+                        <a:schemeClr val="tx1"/>
+                      </a:solidFill>
+                    </a:rPr>
+                    <a:t>Portal Intake: avg_tele_portal_intake_made_5/avg_tele_portal_intake_attempts_5</a:t>
+                  </a:r>
+                </a:p>
+                <a:p>
+                  <a:r>
+                    <a:rPr lang="en-US" sz="800" b="1" dirty="0">
+                      <a:solidFill>
+                        <a:schemeClr val="tx1"/>
+                      </a:solidFill>
+                    </a:rPr>
+                    <a:t>Pyramid Intake: avg_tele_pyramid_intake_5</a:t>
+                  </a:r>
+                </a:p>
+                <a:p>
+                  <a:r>
+                    <a:rPr lang="en-US" sz="800" b="1" dirty="0">
+                      <a:solidFill>
+                        <a:schemeClr val="tx1"/>
+                      </a:solidFill>
+                    </a:rPr>
+                    <a:t>Unprotected Intake: avg_tele_unprotected_intake_5</a:t>
+                  </a:r>
+                </a:p>
+                <a:p>
+                  <a:r>
+                    <a:rPr lang="en-US" sz="800" b="1" dirty="0">
+                      <a:solidFill>
+                        <a:schemeClr val="tx1"/>
+                      </a:solidFill>
+                    </a:rPr>
+                    <a:t>Floor Intake: avg_tele_floor_intake_5</a:t>
+                  </a:r>
+                </a:p>
+                <a:p>
+                  <a:endParaRPr lang="en-US" sz="800" b="1" dirty="0">
                     <a:solidFill>
                       <a:schemeClr val="tx1"/>
                     </a:solidFill>
@@ -9177,32 +9541,109 @@
                 </a:p>
                 <a:p>
                   <a:r>
-                    <a:rPr lang="en-US" sz="1200" b="1" dirty="0">
-                      <a:solidFill>
-                        <a:schemeClr val="tx1"/>
-                      </a:solidFill>
-                    </a:rPr>
-                    <a:t>Climb: tot_climb_5/tot_climb_attempts_5</a:t>
-                  </a:r>
-                </a:p>
-                <a:p>
-                  <a:r>
-                    <a:rPr lang="en-US" sz="1200" b="1" dirty="0">
+                    <a:rPr lang="en-US" sz="800" b="1" dirty="0">
+                      <a:solidFill>
+                        <a:schemeClr val="tx1"/>
+                      </a:solidFill>
+                    </a:rPr>
+                    <a:t>Knockouts: avg_tele_knockouts_5</a:t>
+                  </a:r>
+                </a:p>
+                <a:p>
+                  <a:r>
+                    <a:rPr lang="en-US" sz="800" b="1" dirty="0">
+                      <a:solidFill>
+                        <a:schemeClr val="tx1"/>
+                      </a:solidFill>
+                    </a:rPr>
+                    <a:t>Cubes Dropped: avg_tele_cubes_dropped_5</a:t>
+                  </a:r>
+                </a:p>
+                <a:p>
+                  <a:r>
+                    <a:rPr lang="en-US" sz="800" b="1" dirty="0">
+                      <a:solidFill>
+                        <a:schemeClr val="tx1"/>
+                      </a:solidFill>
+                    </a:rPr>
+                    <a:t>Orderly: tot_tele_orderly_5</a:t>
+                  </a:r>
+                </a:p>
+                <a:p>
+                  <a:r>
+                    <a:rPr lang="en-US" sz="800" b="1" dirty="0">
+                      <a:solidFill>
+                        <a:schemeClr val="tx1"/>
+                      </a:solidFill>
+                    </a:rPr>
+                    <a:t>Highest Level: max_tele_highest_level_5</a:t>
+                  </a:r>
+                </a:p>
+                <a:p>
+                  <a:endParaRPr lang="en-US" sz="800" b="1" dirty="0">
+                    <a:solidFill>
+                      <a:schemeClr val="tx1"/>
+                    </a:solidFill>
+                  </a:endParaRPr>
+                </a:p>
+                <a:p>
+                  <a:r>
+                    <a:rPr lang="en-US" sz="800" b="1" dirty="0">
+                      <a:solidFill>
+                        <a:schemeClr val="tx1"/>
+                      </a:solidFill>
+                    </a:rPr>
+                    <a:t>Climb: tot_tele_climb_5/tot_tele_climb_attempts_5</a:t>
+                  </a:r>
+                </a:p>
+                <a:p>
+                  <a:r>
+                    <a:rPr lang="en-US" sz="800" b="1" dirty="0">
+                      <a:solidFill>
+                        <a:schemeClr val="tx1"/>
+                      </a:solidFill>
+                    </a:rPr>
+                    <a:t>Assisted: tot_tele_climb_assisted_5</a:t>
+                  </a:r>
+                </a:p>
+                <a:p>
+                  <a:r>
+                    <a:rPr lang="en-US" sz="800" b="1" dirty="0">
+                      <a:solidFill>
+                        <a:schemeClr val="tx1"/>
+                      </a:solidFill>
+                    </a:rPr>
+                    <a:t>Plus One: tot_tele_plus_one_5/tot_tele_plus_one_attempts_5</a:t>
+                  </a:r>
+                </a:p>
+                <a:p>
+                  <a:r>
+                    <a:rPr lang="en-US" sz="800" b="1" dirty="0">
+                      <a:solidFill>
+                        <a:schemeClr val="tx1"/>
+                      </a:solidFill>
+                    </a:rPr>
+                    <a:t>Plus Two: tot_tele_plus_two_5/tot_tele_plus_two_attempts_5</a:t>
+                  </a:r>
+                </a:p>
+                <a:p>
+                  <a:r>
+                    <a:rPr lang="en-US" sz="800" b="1" dirty="0">
+                      <a:solidFill>
+                        <a:schemeClr val="tx1"/>
+                      </a:solidFill>
+                    </a:rPr>
+                    <a:t>Mobility: avg_mobility_rating_5</a:t>
+                  </a:r>
+                </a:p>
+                <a:p>
+                  <a:r>
+                    <a:rPr lang="en-US" sz="800" b="1" dirty="0">
                       <a:solidFill>
                         <a:schemeClr val="tx1"/>
                       </a:solidFill>
                     </a:rPr>
                     <a:t>Defense: avg_defense_rating_5</a:t>
-                  </a:r>
-                </a:p>
-                <a:p>
-                  <a:r>
-                    <a:rPr lang="en-US" sz="1200" b="1" dirty="0">
-                      <a:solidFill>
-                        <a:schemeClr val="tx1"/>
-                      </a:solidFill>
-                    </a:rPr>
-                    <a:t>Mobility: avg_mobility_rating_5</a:t>
                   </a:r>
                 </a:p>
               </p:txBody>
@@ -9256,70 +9697,83 @@
                 <a:lstStyle/>
                 <a:p>
                   <a:r>
-                    <a:rPr lang="en-US" sz="1200" b="1" dirty="0">
-                      <a:solidFill>
-                        <a:schemeClr val="tx1"/>
-                      </a:solidFill>
-                    </a:rPr>
-                    <a:t>Baseline: tot_baseline_cross_6</a:t>
-                  </a:r>
-                </a:p>
-                <a:p>
-                  <a:r>
-                    <a:rPr lang="en-US" sz="1200" b="1" dirty="0">
-                      <a:solidFill>
-                        <a:schemeClr val="tx1"/>
-                      </a:solidFill>
-                    </a:rPr>
-                    <a:t>High Goals: avg_auto_high_made_6/avg_auto_high_attempts_6/max_auto_high_made_6</a:t>
-                  </a:r>
-                </a:p>
-                <a:p>
-                  <a:r>
-                    <a:rPr lang="en-US" sz="1200" b="1" dirty="0">
-                      <a:solidFill>
-                        <a:schemeClr val="tx1"/>
-                      </a:solidFill>
-                    </a:rPr>
-                    <a:t>Low Goals: avg_auto_low_made_6/avg_auto_low_attempts_6/max_auto_low_made_6</a:t>
-                  </a:r>
-                </a:p>
-                <a:p>
-                  <a:r>
-                    <a:rPr lang="en-US" sz="1200" b="1" dirty="0">
-                      <a:solidFill>
-                        <a:schemeClr val="tx1"/>
-                      </a:solidFill>
-                    </a:rPr>
-                    <a:t>Hopper Intake: avg_auto_hopper_intake_6</a:t>
-                  </a:r>
-                </a:p>
-                <a:p>
-                  <a:r>
-                    <a:rPr lang="en-US" sz="1200" b="1" dirty="0">
-                      <a:solidFill>
-                        <a:schemeClr val="tx1"/>
-                      </a:solidFill>
-                    </a:rPr>
-                    <a:t>Gears Scored FMB: tot_auto_gears_scored_fdr_6/tot_auto_gears_scored_mid_6/tot_auto_gears_scored_boi_6</a:t>
-                  </a:r>
-                </a:p>
-                <a:p>
-                  <a:r>
-                    <a:rPr lang="en-US" sz="1200" b="1" dirty="0">
-                      <a:solidFill>
-                        <a:schemeClr val="tx1"/>
-                      </a:solidFill>
-                    </a:rPr>
-                    <a:t>Gears Scored Tot: tot_auto_gears_scored_6/tot_auto_gears_attempts_6/max_auto_gears_scored_6</a:t>
-                  </a:r>
-                </a:p>
-                <a:p>
-                  <a:endParaRPr lang="en-US" sz="1200" b="1" dirty="0">
-                    <a:solidFill>
-                      <a:schemeClr val="tx1"/>
-                    </a:solidFill>
-                  </a:endParaRPr>
+                    <a:rPr lang="en-US" sz="800" b="1" dirty="0">
+                      <a:solidFill>
+                        <a:schemeClr val="tx1"/>
+                      </a:solidFill>
+                    </a:rPr>
+                    <a:t>Cross: tot_auto_cross_6</a:t>
+                  </a:r>
+                </a:p>
+                <a:p>
+                  <a:r>
+                    <a:rPr lang="en-US" sz="800" b="1" dirty="0">
+                      <a:solidFill>
+                        <a:schemeClr val="tx1"/>
+                      </a:solidFill>
+                    </a:rPr>
+                    <a:t>High Scale: tot_auto_scale_high_made_6/tot_auto_scale_high_attempts_6</a:t>
+                  </a:r>
+                </a:p>
+                <a:p>
+                  <a:r>
+                    <a:rPr lang="en-US" sz="800" b="1" dirty="0">
+                      <a:solidFill>
+                        <a:schemeClr val="tx1"/>
+                      </a:solidFill>
+                    </a:rPr>
+                    <a:t>Low Scale: tot_auto_scale_low_made_6/tot_auto_scale_low_attempts_6</a:t>
+                  </a:r>
+                </a:p>
+                <a:p>
+                  <a:r>
+                    <a:rPr lang="en-US" sz="800" b="1" dirty="0">
+                      <a:solidFill>
+                        <a:schemeClr val="tx1"/>
+                      </a:solidFill>
+                    </a:rPr>
+                    <a:t>Near Switch: tot_auto_near_switch_made_6/tot_auto_near_switch_attempts_6</a:t>
+                  </a:r>
+                </a:p>
+                <a:p>
+                  <a:r>
+                    <a:rPr lang="en-US" sz="800" b="1" dirty="0">
+                      <a:solidFill>
+                        <a:schemeClr val="tx1"/>
+                      </a:solidFill>
+                    </a:rPr>
+                    <a:t>Exchange: tot_auto_exchange_made_6/tot_auto_exchange_attempts_6</a:t>
+                  </a:r>
+                </a:p>
+                <a:p>
+                  <a:r>
+                    <a:rPr lang="en-US" sz="800" b="1" dirty="0">
+                      <a:solidFill>
+                        <a:schemeClr val="tx1"/>
+                      </a:solidFill>
+                    </a:rPr>
+                    <a:t>Pyramid Intake: tot_auto_pyramid_intake_6</a:t>
+                  </a:r>
+                </a:p>
+                <a:p>
+                  <a:r>
+                    <a:rPr lang="en-US" sz="800" b="1" dirty="0">
+                      <a:solidFill>
+                        <a:schemeClr val="tx1"/>
+                      </a:solidFill>
+                    </a:rPr>
+                    <a:t>Unprotected Intake: tot_auto_unprotected_intake_6</a:t>
+                  </a:r>
+                </a:p>
+                <a:p>
+                  <a:r>
+                    <a:rPr lang="en-US" sz="800" b="1" dirty="0">
+                      <a:solidFill>
+                        <a:schemeClr val="tx1"/>
+                      </a:solidFill>
+                    </a:rPr>
+                    <a:t>Starts LMR: tot_auto_left_6/tot_auto_center_6/tot_auto_right_6</a:t>
+                  </a:r>
                 </a:p>
               </p:txBody>
             </p:sp>
@@ -9372,46 +9826,56 @@
                 <a:lstStyle/>
                 <a:p>
                   <a:r>
-                    <a:rPr lang="en-US" sz="1200" b="1" dirty="0">
-                      <a:solidFill>
-                        <a:schemeClr val="tx1"/>
-                      </a:solidFill>
-                    </a:rPr>
-                    <a:t>High Goals: avg_tele_high_made_6/avg_tele_high_attempts_6/max_tele_high_made_6</a:t>
-                  </a:r>
-                </a:p>
-                <a:p>
-                  <a:r>
-                    <a:rPr lang="en-US" sz="1200" b="1" dirty="0">
-                      <a:solidFill>
-                        <a:schemeClr val="tx1"/>
-                      </a:solidFill>
-                    </a:rPr>
-                    <a:t>Low Goals: avg_tele_low_made_6/avg_tele_low_attempts_6/max_tele_low_made_6</a:t>
-                  </a:r>
-                </a:p>
-                <a:p>
-                  <a:r>
-                    <a:rPr lang="en-US" sz="1200" b="1" dirty="0">
-                      <a:solidFill>
-                        <a:schemeClr val="tx1"/>
-                      </a:solidFill>
-                    </a:rPr>
-                    <a:t>Gears Scored: avg_tele_gears_scored_6/avg_tele_gears_attempts_6/max_tele_gears_scored_6</a:t>
-                  </a:r>
-                </a:p>
-                <a:p>
-                  <a:r>
-                    <a:rPr lang="en-US" sz="1200" b="1" dirty="0">
-                      <a:solidFill>
-                        <a:schemeClr val="tx1"/>
-                      </a:solidFill>
-                    </a:rPr>
-                    <a:t>Gears KO: tot_tele_gear_knockouts_6</a:t>
-                  </a:r>
-                </a:p>
-                <a:p>
-                  <a:endParaRPr lang="en-US" sz="1200" b="1" dirty="0">
+                    <a:rPr lang="en-US" sz="800" b="1" dirty="0">
+                      <a:solidFill>
+                        <a:schemeClr val="tx1"/>
+                      </a:solidFill>
+                    </a:rPr>
+                    <a:t>Exchange: avg_tele_exchange_made_6/avg_tele_exchange_attempts_6</a:t>
+                  </a:r>
+                </a:p>
+                <a:p>
+                  <a:r>
+                    <a:rPr lang="en-US" sz="800" b="1" dirty="0">
+                      <a:solidFill>
+                        <a:schemeClr val="tx1"/>
+                      </a:solidFill>
+                    </a:rPr>
+                    <a:t>Near Switch: avg_tele_near_switch_made_6/avg_tele_near_switch_attempts_6</a:t>
+                  </a:r>
+                </a:p>
+                <a:p>
+                  <a:r>
+                    <a:rPr lang="en-US" sz="800" b="1" dirty="0">
+                      <a:solidFill>
+                        <a:schemeClr val="tx1"/>
+                      </a:solidFill>
+                    </a:rPr>
+                    <a:t>Far Switch: avg_tele_far_switch_made_6/avg_tele_far_switch_attempts_6</a:t>
+                  </a:r>
+                </a:p>
+                <a:p>
+                  <a:r>
+                    <a:rPr lang="en-US" sz="800" b="1" dirty="0">
+                      <a:solidFill>
+                        <a:schemeClr val="tx1"/>
+                      </a:solidFill>
+                    </a:rPr>
+                    <a:t>Scale High: avg_tele_scale_high_made_6/avg_tele_scale_high_attempts_6</a:t>
+                  </a:r>
+                </a:p>
+                <a:p>
+                  <a:r>
+                    <a:rPr lang="en-US" sz="800" b="1" dirty="0">
+                      <a:solidFill>
+                        <a:schemeClr val="tx1"/>
+                      </a:solidFill>
+                    </a:rPr>
+                    <a:t>Scale Low: avg_tele_scale_low_made_6/avg_tele_scale_low_attempts_6</a:t>
+                  </a:r>
+                </a:p>
+                <a:p>
+                  <a:endParaRPr lang="en-US" sz="800" b="1" dirty="0">
                     <a:solidFill>
                       <a:schemeClr val="tx1"/>
                     </a:solidFill>
@@ -9419,46 +9883,46 @@
                 </a:p>
                 <a:p>
                   <a:r>
-                    <a:rPr lang="en-US" sz="1200" b="1" dirty="0">
-                      <a:solidFill>
-                        <a:schemeClr val="tx1"/>
-                      </a:solidFill>
-                    </a:rPr>
-                    <a:t>Floor Ball Intake: avg_tele_floor_ball_intake_6</a:t>
-                  </a:r>
-                </a:p>
-                <a:p>
-                  <a:r>
-                    <a:rPr lang="en-US" sz="1200" b="1" dirty="0">
-                      <a:solidFill>
-                        <a:schemeClr val="tx1"/>
-                      </a:solidFill>
-                    </a:rPr>
-                    <a:t>Hopper Ball Intake: avg_tele_hopper_intake_6</a:t>
-                  </a:r>
-                </a:p>
-                <a:p>
-                  <a:r>
-                    <a:rPr lang="en-US" sz="1200" b="1" dirty="0">
-                      <a:solidFill>
-                        <a:schemeClr val="tx1"/>
-                      </a:solidFill>
-                    </a:rPr>
-                    <a:t>Floor Gear Intake: avg_tele_floor_gear_intake_6</a:t>
-                  </a:r>
-                </a:p>
-                <a:p>
-                  <a:r>
-                    <a:rPr lang="en-US" sz="1200" b="1" dirty="0">
-                      <a:solidFill>
-                        <a:schemeClr val="tx1"/>
-                      </a:solidFill>
-                    </a:rPr>
-                    <a:t>HP Gear Intake: avg_hp_gear_intake_6/avg_hp_gear_intake_miss_6</a:t>
-                  </a:r>
-                </a:p>
-                <a:p>
-                  <a:endParaRPr lang="en-US" sz="1200" b="1" dirty="0">
+                    <a:rPr lang="en-US" sz="800" b="1" dirty="0">
+                      <a:solidFill>
+                        <a:schemeClr val="tx1"/>
+                      </a:solidFill>
+                    </a:rPr>
+                    <a:t>Portal Intake: avg_tele_portal_intake_made_6/avg_tele_portal_intake_attempts_6</a:t>
+                  </a:r>
+                </a:p>
+                <a:p>
+                  <a:r>
+                    <a:rPr lang="en-US" sz="800" b="1" dirty="0">
+                      <a:solidFill>
+                        <a:schemeClr val="tx1"/>
+                      </a:solidFill>
+                    </a:rPr>
+                    <a:t>Pyramid Intake: avg_tele_pyramid_intake_6</a:t>
+                  </a:r>
+                </a:p>
+                <a:p>
+                  <a:r>
+                    <a:rPr lang="en-US" sz="800" b="1" dirty="0">
+                      <a:solidFill>
+                        <a:schemeClr val="tx1"/>
+                      </a:solidFill>
+                    </a:rPr>
+                    <a:t>Unprotected Intake: avg_tele_unprotected_intake_6</a:t>
+                  </a:r>
+                </a:p>
+                <a:p>
+                  <a:r>
+                    <a:rPr lang="en-US" sz="800" b="1" dirty="0">
+                      <a:solidFill>
+                        <a:schemeClr val="tx1"/>
+                      </a:solidFill>
+                    </a:rPr>
+                    <a:t>Floor Intake: avg_tele_floor_intake_6</a:t>
+                  </a:r>
+                </a:p>
+                <a:p>
+                  <a:endParaRPr lang="en-US" sz="800" b="1" dirty="0">
                     <a:solidFill>
                       <a:schemeClr val="tx1"/>
                     </a:solidFill>
@@ -9466,32 +9930,109 @@
                 </a:p>
                 <a:p>
                   <a:r>
-                    <a:rPr lang="en-US" sz="1200" b="1" dirty="0">
-                      <a:solidFill>
-                        <a:schemeClr val="tx1"/>
-                      </a:solidFill>
-                    </a:rPr>
-                    <a:t>Climb: tot_climb_6/tot_climb_attempts_6</a:t>
-                  </a:r>
-                </a:p>
-                <a:p>
-                  <a:r>
-                    <a:rPr lang="en-US" sz="1200" b="1" dirty="0">
+                    <a:rPr lang="en-US" sz="800" b="1" dirty="0">
+                      <a:solidFill>
+                        <a:schemeClr val="tx1"/>
+                      </a:solidFill>
+                    </a:rPr>
+                    <a:t>Knockouts: avg_tele_knockouts_6</a:t>
+                  </a:r>
+                </a:p>
+                <a:p>
+                  <a:r>
+                    <a:rPr lang="en-US" sz="800" b="1" dirty="0">
+                      <a:solidFill>
+                        <a:schemeClr val="tx1"/>
+                      </a:solidFill>
+                    </a:rPr>
+                    <a:t>Cubes Dropped: avg_tele_cubes_dropped_6</a:t>
+                  </a:r>
+                </a:p>
+                <a:p>
+                  <a:r>
+                    <a:rPr lang="en-US" sz="800" b="1" dirty="0">
+                      <a:solidFill>
+                        <a:schemeClr val="tx1"/>
+                      </a:solidFill>
+                    </a:rPr>
+                    <a:t>Orderly: tot_tele_orderly_6</a:t>
+                  </a:r>
+                </a:p>
+                <a:p>
+                  <a:r>
+                    <a:rPr lang="en-US" sz="800" b="1" dirty="0">
+                      <a:solidFill>
+                        <a:schemeClr val="tx1"/>
+                      </a:solidFill>
+                    </a:rPr>
+                    <a:t>Highest Level: max_tele_highest_level_6</a:t>
+                  </a:r>
+                </a:p>
+                <a:p>
+                  <a:endParaRPr lang="en-US" sz="800" b="1" dirty="0">
+                    <a:solidFill>
+                      <a:schemeClr val="tx1"/>
+                    </a:solidFill>
+                  </a:endParaRPr>
+                </a:p>
+                <a:p>
+                  <a:r>
+                    <a:rPr lang="en-US" sz="800" b="1" dirty="0">
+                      <a:solidFill>
+                        <a:schemeClr val="tx1"/>
+                      </a:solidFill>
+                    </a:rPr>
+                    <a:t>Climb: tot_tele_climb_6/tot_tele_climb_attempts_6</a:t>
+                  </a:r>
+                </a:p>
+                <a:p>
+                  <a:r>
+                    <a:rPr lang="en-US" sz="800" b="1" dirty="0">
+                      <a:solidFill>
+                        <a:schemeClr val="tx1"/>
+                      </a:solidFill>
+                    </a:rPr>
+                    <a:t>Assisted: tot_tele_climb_assisted_6</a:t>
+                  </a:r>
+                </a:p>
+                <a:p>
+                  <a:r>
+                    <a:rPr lang="en-US" sz="800" b="1" dirty="0">
+                      <a:solidFill>
+                        <a:schemeClr val="tx1"/>
+                      </a:solidFill>
+                    </a:rPr>
+                    <a:t>Plus One: tot_tele_plus_one_6/tot_tele_plus_one_attempts_6</a:t>
+                  </a:r>
+                </a:p>
+                <a:p>
+                  <a:r>
+                    <a:rPr lang="en-US" sz="800" b="1" dirty="0">
+                      <a:solidFill>
+                        <a:schemeClr val="tx1"/>
+                      </a:solidFill>
+                    </a:rPr>
+                    <a:t>Plus Two: tot_tele_plus_two_6/tot_tele_plus_two_attempts_6</a:t>
+                  </a:r>
+                </a:p>
+                <a:p>
+                  <a:r>
+                    <a:rPr lang="en-US" sz="800" b="1" dirty="0">
+                      <a:solidFill>
+                        <a:schemeClr val="tx1"/>
+                      </a:solidFill>
+                    </a:rPr>
+                    <a:t>Mobility: avg_mobility_rating_6</a:t>
+                  </a:r>
+                </a:p>
+                <a:p>
+                  <a:r>
+                    <a:rPr lang="en-US" sz="800" b="1" dirty="0">
                       <a:solidFill>
                         <a:schemeClr val="tx1"/>
                       </a:solidFill>
                     </a:rPr>
                     <a:t>Defense: avg_defense_rating_6</a:t>
-                  </a:r>
-                </a:p>
-                <a:p>
-                  <a:r>
-                    <a:rPr lang="en-US" sz="1200" b="1" dirty="0">
-                      <a:solidFill>
-                        <a:schemeClr val="tx1"/>
-                      </a:solidFill>
-                    </a:rPr>
-                    <a:t>Mobility: avg_mobility_rating_6</a:t>
                   </a:r>
                 </a:p>
               </p:txBody>
@@ -9628,8 +10169,8 @@
               </p:nvSpPr>
               <p:spPr>
                 <a:xfrm>
-                  <a:off x="2585668" y="867326"/>
-                  <a:ext cx="1313728" cy="268883"/>
+                  <a:off x="2553759" y="862058"/>
+                  <a:ext cx="1331332" cy="282414"/>
                 </a:xfrm>
                 <a:prstGeom prst="rect">
                   <a:avLst/>
@@ -9670,28 +10211,23 @@
                 <a:p>
                   <a:pPr algn="ctr"/>
                   <a:r>
-                    <a:rPr lang="en-US" sz="1200" b="1" dirty="0">
-                      <a:solidFill>
-                        <a:schemeClr val="tx1"/>
-                      </a:solidFill>
-                    </a:rPr>
-                    <a:t>Avg. </a:t>
-                  </a:r>
-                  <a:r>
-                    <a:rPr lang="en-US" sz="1200" b="1" dirty="0" err="1">
-                      <a:solidFill>
-                        <a:schemeClr val="tx1"/>
-                      </a:solidFill>
-                    </a:rPr>
-                    <a:t>kPa</a:t>
-                  </a:r>
-                  <a:r>
-                    <a:rPr lang="en-US" sz="1200" b="1" dirty="0">
-                      <a:solidFill>
-                        <a:schemeClr val="tx1"/>
-                      </a:solidFill>
-                    </a:rPr>
-                    <a:t>: avg_auto_contrib_kpa_3/avg_contrib_kpa_3/max_contrib_kpa_3</a:t>
+                    <a:rPr lang="en-US" sz="800" b="1" dirty="0">
+                      <a:solidFill>
+                        <a:schemeClr val="tx1"/>
+                      </a:solidFill>
+                    </a:rPr>
+                    <a:t>Avg. Intake: avg_tele_intake_3/max_tele_intake_3</a:t>
+                  </a:r>
+                </a:p>
+                <a:p>
+                  <a:pPr algn="ctr"/>
+                  <a:r>
+                    <a:rPr lang="en-US" sz="800" b="1" dirty="0">
+                      <a:solidFill>
+                        <a:schemeClr val="tx1"/>
+                      </a:solidFill>
+                    </a:rPr>
+                    <a:t>Avg. Intake: avg_tele_cubes_scored_3/max_tele_cubes_scored_3</a:t>
                   </a:r>
                 </a:p>
               </p:txBody>
@@ -9704,8 +10240,8 @@
               </p:nvSpPr>
               <p:spPr>
                 <a:xfrm>
-                  <a:off x="1284039" y="866840"/>
-                  <a:ext cx="1300532" cy="268883"/>
+                  <a:off x="1284039" y="866839"/>
+                  <a:ext cx="1269720" cy="273646"/>
                 </a:xfrm>
                 <a:prstGeom prst="rect">
                   <a:avLst/>
@@ -9746,28 +10282,165 @@
                 <a:p>
                   <a:pPr algn="ctr"/>
                   <a:r>
-                    <a:rPr lang="en-US" sz="1200" b="1" dirty="0">
-                      <a:solidFill>
-                        <a:schemeClr val="tx1"/>
-                      </a:solidFill>
-                    </a:rPr>
-                    <a:t>Avg. </a:t>
-                  </a:r>
-                  <a:r>
-                    <a:rPr lang="en-US" sz="1200" b="1" dirty="0" err="1">
-                      <a:solidFill>
-                        <a:schemeClr val="tx1"/>
-                      </a:solidFill>
-                    </a:rPr>
-                    <a:t>kPa</a:t>
-                  </a:r>
-                  <a:r>
-                    <a:rPr lang="en-US" sz="1200" b="1" dirty="0">
-                      <a:solidFill>
-                        <a:schemeClr val="tx1"/>
-                      </a:solidFill>
-                    </a:rPr>
-                    <a:t>: avg_auto_contrib_kpa_2/avg_contrib_kpa_2/max_contrib_kpa_2</a:t>
+                    <a:rPr lang="en-US" sz="800" b="1" dirty="0">
+                      <a:solidFill>
+                        <a:schemeClr val="tx1"/>
+                      </a:solidFill>
+                    </a:rPr>
+                    <a:t>Avg. Intake: avg_tele_intake_2/max_tele_intake_2</a:t>
+                  </a:r>
+                </a:p>
+                <a:p>
+                  <a:pPr algn="ctr"/>
+                  <a:r>
+                    <a:rPr lang="en-US" sz="800" b="1" dirty="0">
+                      <a:solidFill>
+                        <a:schemeClr val="tx1"/>
+                      </a:solidFill>
+                    </a:rPr>
+                    <a:t>Avg. Intake: avg_tele_cubes_scored_2/max_tele_cubes_scored_2</a:t>
+                  </a:r>
+                </a:p>
+              </p:txBody>
+            </p:sp>
+            <p:sp>
+              <p:nvSpPr>
+                <p:cNvPr id="67" name="Rectangle 66"/>
+                <p:cNvSpPr/>
+                <p:nvPr/>
+              </p:nvSpPr>
+              <p:spPr>
+                <a:xfrm>
+                  <a:off x="5184539" y="867008"/>
+                  <a:ext cx="1259331" cy="268883"/>
+                </a:xfrm>
+                <a:prstGeom prst="rect">
+                  <a:avLst/>
+                </a:prstGeom>
+                <a:solidFill>
+                  <a:schemeClr val="bg1"/>
+                </a:solidFill>
+                <a:ln w="38100">
+                  <a:solidFill>
+                    <a:schemeClr val="tx1"/>
+                  </a:solidFill>
+                </a:ln>
+              </p:spPr>
+              <p:style>
+                <a:lnRef idx="2">
+                  <a:schemeClr val="accent1">
+                    <a:shade val="50000"/>
+                  </a:schemeClr>
+                </a:lnRef>
+                <a:fillRef idx="1">
+                  <a:schemeClr val="accent1"/>
+                </a:fillRef>
+                <a:effectRef idx="0">
+                  <a:schemeClr val="accent1"/>
+                </a:effectRef>
+                <a:fontRef idx="minor">
+                  <a:schemeClr val="lt1"/>
+                </a:fontRef>
+              </p:style>
+              <p:txBody>
+                <a:bodyPr rot="0" spcFirstLastPara="0" vertOverflow="overflow" horzOverflow="overflow" vert="horz" wrap="square" lIns="91440" tIns="45720" rIns="91440" bIns="45720" numCol="1" spcCol="0" rtlCol="0" fromWordArt="0" anchor="ctr" anchorCtr="0" forceAA="0" compatLnSpc="1">
+                  <a:prstTxWarp prst="textNoShape">
+                    <a:avLst/>
+                  </a:prstTxWarp>
+                  <a:noAutofit/>
+                </a:bodyPr>
+                <a:lstStyle/>
+                <a:p>
+                  <a:pPr algn="ctr"/>
+                  <a:r>
+                    <a:rPr lang="en-US" sz="800" b="1" dirty="0">
+                      <a:solidFill>
+                        <a:schemeClr val="tx1"/>
+                      </a:solidFill>
+                    </a:rPr>
+                    <a:t>Avg. Intake: avg_tele_intake_5/max_tele_intake_5</a:t>
+                  </a:r>
+                </a:p>
+                <a:p>
+                  <a:pPr algn="ctr"/>
+                  <a:r>
+                    <a:rPr lang="en-US" sz="800" b="1" dirty="0">
+                      <a:solidFill>
+                        <a:schemeClr val="tx1"/>
+                      </a:solidFill>
+                    </a:rPr>
+                    <a:t>Avg. Intake: avg_tele_cubes_scored_5/max_tele_cubes_scored_5</a:t>
+                  </a:r>
+                </a:p>
+              </p:txBody>
+            </p:sp>
+            <p:sp>
+              <p:nvSpPr>
+                <p:cNvPr id="68" name="Rectangle 67"/>
+                <p:cNvSpPr/>
+                <p:nvPr/>
+              </p:nvSpPr>
+              <p:spPr>
+                <a:xfrm>
+                  <a:off x="6449547" y="867008"/>
+                  <a:ext cx="1329454" cy="268883"/>
+                </a:xfrm>
+                <a:prstGeom prst="rect">
+                  <a:avLst/>
+                </a:prstGeom>
+                <a:solidFill>
+                  <a:schemeClr val="bg1"/>
+                </a:solidFill>
+                <a:ln w="38100">
+                  <a:solidFill>
+                    <a:schemeClr val="tx1"/>
+                  </a:solidFill>
+                </a:ln>
+              </p:spPr>
+              <p:style>
+                <a:lnRef idx="2">
+                  <a:schemeClr val="accent1">
+                    <a:shade val="50000"/>
+                  </a:schemeClr>
+                </a:lnRef>
+                <a:fillRef idx="1">
+                  <a:schemeClr val="accent1"/>
+                </a:fillRef>
+                <a:effectRef idx="0">
+                  <a:schemeClr val="accent1"/>
+                </a:effectRef>
+                <a:fontRef idx="minor">
+                  <a:schemeClr val="lt1"/>
+                </a:fontRef>
+              </p:style>
+              <p:txBody>
+                <a:bodyPr rot="0" spcFirstLastPara="0" vertOverflow="overflow" horzOverflow="overflow" vert="horz" wrap="square" lIns="91440" tIns="45720" rIns="91440" bIns="45720" numCol="1" spcCol="0" rtlCol="0" fromWordArt="0" anchor="ctr" anchorCtr="0" forceAA="0" compatLnSpc="1">
+                  <a:prstTxWarp prst="textNoShape">
+                    <a:avLst/>
+                  </a:prstTxWarp>
+                  <a:noAutofit/>
+                </a:bodyPr>
+                <a:lstStyle/>
+                <a:p>
+                  <a:pPr algn="ctr"/>
+                  <a:r>
+                    <a:rPr lang="en-US" sz="800" b="1" dirty="0">
+                      <a:solidFill>
+                        <a:schemeClr val="tx1"/>
+                      </a:solidFill>
+                    </a:rPr>
+                    <a:t>Avg. Intake: avg_tele_intake_6/max_tele_intake_6</a:t>
+                  </a:r>
+                </a:p>
+                <a:p>
+                  <a:pPr algn="ctr"/>
+                  <a:r>
+                    <a:rPr lang="en-US" sz="800" b="1" dirty="0">
+                      <a:solidFill>
+                        <a:schemeClr val="tx1"/>
+                      </a:solidFill>
+                    </a:rPr>
+                    <a:t>Avg. Intake: avg_tele_cubes_scored_6/max_tele_cubes_scored_6</a:t>
                   </a:r>
                 </a:p>
               </p:txBody>
@@ -9855,8 +10528,8 @@
           </p:nvSpPr>
           <p:spPr>
             <a:xfrm>
-              <a:off x="-3466" y="1563034"/>
-              <a:ext cx="2029968" cy="365760"/>
+              <a:off x="12300" y="1560794"/>
+              <a:ext cx="1995323" cy="367999"/>
             </a:xfrm>
             <a:prstGeom prst="rect">
               <a:avLst/>
@@ -9897,7 +10570,7 @@
             <a:p>
               <a:pPr algn="ctr"/>
               <a:r>
-                <a:rPr lang="en-US" sz="1200" b="1" dirty="0">
+                <a:rPr lang="en-US" sz="800" b="1" dirty="0">
                   <a:solidFill>
                     <a:schemeClr val="tx1"/>
                   </a:solidFill>
@@ -9915,8 +10588,8 @@
           </p:nvSpPr>
           <p:spPr>
             <a:xfrm>
-              <a:off x="2034912" y="1563034"/>
-              <a:ext cx="2029968" cy="365760"/>
+              <a:off x="2007624" y="1563034"/>
+              <a:ext cx="1986938" cy="365760"/>
             </a:xfrm>
             <a:prstGeom prst="rect">
               <a:avLst/>
@@ -9957,7 +10630,7 @@
             <a:p>
               <a:pPr algn="ctr"/>
               <a:r>
-                <a:rPr lang="en-US" sz="1200" b="1" dirty="0">
+                <a:rPr lang="en-US" sz="800" b="1" dirty="0">
                   <a:solidFill>
                     <a:schemeClr val="tx1"/>
                   </a:solidFill>
@@ -9975,8 +10648,8 @@
           </p:nvSpPr>
           <p:spPr>
             <a:xfrm>
-              <a:off x="4072266" y="1563034"/>
-              <a:ext cx="2011067" cy="365760"/>
+              <a:off x="3994562" y="1563034"/>
+              <a:ext cx="2085094" cy="365760"/>
             </a:xfrm>
             <a:prstGeom prst="rect">
               <a:avLst/>
@@ -10017,7 +10690,7 @@
             <a:p>
               <a:pPr algn="ctr"/>
               <a:r>
-                <a:rPr lang="en-US" sz="1200" b="1" dirty="0">
+                <a:rPr lang="en-US" sz="800" b="1" dirty="0">
                   <a:solidFill>
                     <a:schemeClr val="tx1"/>
                   </a:solidFill>
@@ -10035,8 +10708,8 @@
           </p:nvSpPr>
           <p:spPr>
             <a:xfrm>
-              <a:off x="6094712" y="1563034"/>
-              <a:ext cx="2029968" cy="365760"/>
+              <a:off x="6102888" y="1563034"/>
+              <a:ext cx="2010180" cy="365760"/>
             </a:xfrm>
             <a:prstGeom prst="rect">
               <a:avLst/>
@@ -10077,7 +10750,7 @@
             <a:p>
               <a:pPr algn="ctr"/>
               <a:r>
-                <a:rPr lang="en-US" sz="1200" b="1" dirty="0">
+                <a:rPr lang="en-US" sz="800" b="1" dirty="0">
                   <a:solidFill>
                     <a:schemeClr val="tx1"/>
                   </a:solidFill>
@@ -10095,8 +10768,8 @@
           </p:nvSpPr>
           <p:spPr>
             <a:xfrm>
-              <a:off x="8133090" y="1563034"/>
-              <a:ext cx="2029968" cy="365760"/>
+              <a:off x="8113068" y="1563034"/>
+              <a:ext cx="1970702" cy="365760"/>
             </a:xfrm>
             <a:prstGeom prst="rect">
               <a:avLst/>
@@ -10137,7 +10810,7 @@
             <a:p>
               <a:pPr algn="ctr"/>
               <a:r>
-                <a:rPr lang="en-US" sz="1200" b="1" dirty="0">
+                <a:rPr lang="en-US" sz="800" b="1" dirty="0">
                   <a:solidFill>
                     <a:schemeClr val="tx1"/>
                   </a:solidFill>
@@ -10155,8 +10828,8 @@
           </p:nvSpPr>
           <p:spPr>
             <a:xfrm>
-              <a:off x="10170444" y="1563034"/>
-              <a:ext cx="2011067" cy="365760"/>
+              <a:off x="10083771" y="1563034"/>
+              <a:ext cx="2085865" cy="365760"/>
             </a:xfrm>
             <a:prstGeom prst="rect">
               <a:avLst/>
@@ -10197,7 +10870,7 @@
             <a:p>
               <a:pPr algn="ctr"/>
               <a:r>
-                <a:rPr lang="en-US" sz="1200" b="1" dirty="0">
+                <a:rPr lang="en-US" sz="800" b="1" dirty="0">
                   <a:solidFill>
                     <a:schemeClr val="tx1"/>
                   </a:solidFill>

</xml_diff>